<commit_message>
Poster ready for OH
</commit_message>
<xml_diff>
--- a/poster/poster.pptx
+++ b/poster/poster.pptx
@@ -238,7 +238,7 @@
           <a:p>
             <a:fld id="{45DBEBB1-4C23-6745-9D21-86F7D825788B}" type="datetimeFigureOut">
               <a:rPr lang="en-US" smtClean="0"/>
-              <a:t>12/2/19</a:t>
+              <a:t>12/3/19</a:t>
             </a:fld>
             <a:endParaRPr lang="en-US"/>
           </a:p>
@@ -505,6 +505,90 @@
 </p:notesMaster>
 </file>
 
+<file path=ppt/notesSlides/notesSlide1.xml><?xml version="1.0" encoding="utf-8"?>
+<p:notes xmlns:a="http://schemas.openxmlformats.org/drawingml/2006/main" xmlns:r="http://schemas.openxmlformats.org/officeDocument/2006/relationships" xmlns:p="http://schemas.openxmlformats.org/presentationml/2006/main">
+  <p:cSld>
+    <p:spTree>
+      <p:nvGrpSpPr>
+        <p:cNvPr id="1" name=""/>
+        <p:cNvGrpSpPr/>
+        <p:nvPr/>
+      </p:nvGrpSpPr>
+      <p:grpSpPr>
+        <a:xfrm>
+          <a:off x="0" y="0"/>
+          <a:ext cx="0" cy="0"/>
+          <a:chOff x="0" y="0"/>
+          <a:chExt cx="0" cy="0"/>
+        </a:xfrm>
+      </p:grpSpPr>
+      <p:sp>
+        <p:nvSpPr>
+          <p:cNvPr id="2" name="Slide Image Placeholder 1"/>
+          <p:cNvSpPr>
+            <a:spLocks noGrp="1" noRot="1" noChangeAspect="1"/>
+          </p:cNvSpPr>
+          <p:nvPr>
+            <p:ph type="sldImg"/>
+          </p:nvPr>
+        </p:nvSpPr>
+        <p:spPr/>
+      </p:sp>
+      <p:sp>
+        <p:nvSpPr>
+          <p:cNvPr id="3" name="Notes Placeholder 2"/>
+          <p:cNvSpPr>
+            <a:spLocks noGrp="1"/>
+          </p:cNvSpPr>
+          <p:nvPr>
+            <p:ph type="body" idx="1"/>
+          </p:nvPr>
+        </p:nvSpPr>
+        <p:spPr/>
+        <p:txBody>
+          <a:bodyPr/>
+          <a:lstStyle/>
+          <a:p>
+            <a:endParaRPr lang="en-US" dirty="0"/>
+          </a:p>
+        </p:txBody>
+      </p:sp>
+      <p:sp>
+        <p:nvSpPr>
+          <p:cNvPr id="4" name="Slide Number Placeholder 3"/>
+          <p:cNvSpPr>
+            <a:spLocks noGrp="1"/>
+          </p:cNvSpPr>
+          <p:nvPr>
+            <p:ph type="sldNum" sz="quarter" idx="5"/>
+          </p:nvPr>
+        </p:nvSpPr>
+        <p:spPr/>
+        <p:txBody>
+          <a:bodyPr/>
+          <a:lstStyle/>
+          <a:p>
+            <a:fld id="{5FA3D529-CD6B-8C47-895C-527FA0529A02}" type="slidenum">
+              <a:rPr lang="en-US" smtClean="0"/>
+              <a:t>1</a:t>
+            </a:fld>
+            <a:endParaRPr lang="en-US"/>
+          </a:p>
+        </p:txBody>
+      </p:sp>
+    </p:spTree>
+    <p:extLst>
+      <p:ext uri="{BB962C8B-B14F-4D97-AF65-F5344CB8AC3E}">
+        <p14:creationId xmlns:p14="http://schemas.microsoft.com/office/powerpoint/2010/main" val="2702560650"/>
+      </p:ext>
+    </p:extLst>
+  </p:cSld>
+  <p:clrMapOvr>
+    <a:masterClrMapping/>
+  </p:clrMapOvr>
+</p:notes>
+</file>
+
 <file path=ppt/slideLayouts/slideLayout1.xml><?xml version="1.0" encoding="utf-8"?>
 <p:sldLayout xmlns:a="http://schemas.openxmlformats.org/drawingml/2006/main" xmlns:r="http://schemas.openxmlformats.org/officeDocument/2006/relationships" xmlns:p="http://schemas.openxmlformats.org/presentationml/2006/main" type="title" preserve="1">
   <p:cSld name="Title Slide">
@@ -700,7 +784,7 @@
               <a:pPr>
                 <a:defRPr/>
               </a:pPr>
-              <a:t>12/2/19</a:t>
+              <a:t>12/3/19</a:t>
             </a:fld>
             <a:endParaRPr lang="en-US"/>
           </a:p>
@@ -908,7 +992,7 @@
               <a:pPr>
                 <a:defRPr/>
               </a:pPr>
-              <a:t>12/2/19</a:t>
+              <a:t>12/3/19</a:t>
             </a:fld>
             <a:endParaRPr lang="en-US"/>
           </a:p>
@@ -1126,7 +1210,7 @@
               <a:pPr>
                 <a:defRPr/>
               </a:pPr>
-              <a:t>12/2/19</a:t>
+              <a:t>12/3/19</a:t>
             </a:fld>
             <a:endParaRPr lang="en-US"/>
           </a:p>
@@ -1334,7 +1418,7 @@
               <a:pPr>
                 <a:defRPr/>
               </a:pPr>
-              <a:t>12/2/19</a:t>
+              <a:t>12/3/19</a:t>
             </a:fld>
             <a:endParaRPr lang="en-US"/>
           </a:p>
@@ -1619,7 +1703,7 @@
               <a:pPr>
                 <a:defRPr/>
               </a:pPr>
-              <a:t>12/2/19</a:t>
+              <a:t>12/3/19</a:t>
             </a:fld>
             <a:endParaRPr lang="en-US"/>
           </a:p>
@@ -1944,7 +2028,7 @@
               <a:pPr>
                 <a:defRPr/>
               </a:pPr>
-              <a:t>12/2/19</a:t>
+              <a:t>12/3/19</a:t>
             </a:fld>
             <a:endParaRPr lang="en-US"/>
           </a:p>
@@ -2408,7 +2492,7 @@
               <a:pPr>
                 <a:defRPr/>
               </a:pPr>
-              <a:t>12/2/19</a:t>
+              <a:t>12/3/19</a:t>
             </a:fld>
             <a:endParaRPr lang="en-US"/>
           </a:p>
@@ -2565,7 +2649,7 @@
               <a:pPr>
                 <a:defRPr/>
               </a:pPr>
-              <a:t>12/2/19</a:t>
+              <a:t>12/3/19</a:t>
             </a:fld>
             <a:endParaRPr lang="en-US"/>
           </a:p>
@@ -2700,7 +2784,7 @@
               <a:pPr>
                 <a:defRPr/>
               </a:pPr>
-              <a:t>12/2/19</a:t>
+              <a:t>12/3/19</a:t>
             </a:fld>
             <a:endParaRPr lang="en-US"/>
           </a:p>
@@ -3015,7 +3099,7 @@
               <a:pPr>
                 <a:defRPr/>
               </a:pPr>
-              <a:t>12/2/19</a:t>
+              <a:t>12/3/19</a:t>
             </a:fld>
             <a:endParaRPr lang="en-US"/>
           </a:p>
@@ -3310,7 +3394,7 @@
               <a:pPr>
                 <a:defRPr/>
               </a:pPr>
-              <a:t>12/2/19</a:t>
+              <a:t>12/3/19</a:t>
             </a:fld>
             <a:endParaRPr lang="en-US"/>
           </a:p>
@@ -3631,7 +3715,7 @@
               <a:pPr>
                 <a:defRPr/>
               </a:pPr>
-              <a:t>12/2/19</a:t>
+              <a:t>12/3/19</a:t>
             </a:fld>
             <a:endParaRPr lang="en-US"/>
           </a:p>
@@ -4156,6 +4240,114 @@
           <a:chExt cx="0" cy="0"/>
         </a:xfrm>
       </p:grpSpPr>
+      <p:pic>
+        <p:nvPicPr>
+          <p:cNvPr id="71" name="Picture 70">
+            <a:extLst>
+              <a:ext uri="{FF2B5EF4-FFF2-40B4-BE49-F238E27FC236}">
+                <a16:creationId xmlns:a16="http://schemas.microsoft.com/office/drawing/2014/main" id="{F1527A6F-063E-974B-8CAC-F99B6CA497A5}"/>
+              </a:ext>
+            </a:extLst>
+          </p:cNvPr>
+          <p:cNvPicPr>
+            <a:picLocks noChangeAspect="1"/>
+          </p:cNvPicPr>
+          <p:nvPr/>
+        </p:nvPicPr>
+        <p:blipFill>
+          <a:blip r:embed="rId3">
+            <a:extLst>
+              <a:ext uri="{28A0092B-C50C-407E-A947-70E740481C1C}">
+                <a14:useLocalDpi xmlns:a14="http://schemas.microsoft.com/office/drawing/2010/main" val="0"/>
+              </a:ext>
+            </a:extLst>
+          </a:blip>
+          <a:stretch>
+            <a:fillRect/>
+          </a:stretch>
+        </p:blipFill>
+        <p:spPr>
+          <a:xfrm>
+            <a:off x="12122725" y="15952715"/>
+            <a:ext cx="8725097" cy="5969803"/>
+          </a:xfrm>
+          <a:prstGeom prst="rect">
+            <a:avLst/>
+          </a:prstGeom>
+        </p:spPr>
+      </p:pic>
+      <p:pic>
+        <p:nvPicPr>
+          <p:cNvPr id="69" name="Picture 68">
+            <a:extLst>
+              <a:ext uri="{FF2B5EF4-FFF2-40B4-BE49-F238E27FC236}">
+                <a16:creationId xmlns:a16="http://schemas.microsoft.com/office/drawing/2014/main" id="{919E7550-47B4-4B45-A9BD-E51C6ACDD80C}"/>
+              </a:ext>
+            </a:extLst>
+          </p:cNvPr>
+          <p:cNvPicPr>
+            <a:picLocks noChangeAspect="1"/>
+          </p:cNvPicPr>
+          <p:nvPr/>
+        </p:nvPicPr>
+        <p:blipFill>
+          <a:blip r:embed="rId4">
+            <a:extLst>
+              <a:ext uri="{28A0092B-C50C-407E-A947-70E740481C1C}">
+                <a14:useLocalDpi xmlns:a14="http://schemas.microsoft.com/office/drawing/2010/main" val="0"/>
+              </a:ext>
+            </a:extLst>
+          </a:blip>
+          <a:stretch>
+            <a:fillRect/>
+          </a:stretch>
+        </p:blipFill>
+        <p:spPr>
+          <a:xfrm>
+            <a:off x="12062415" y="9819129"/>
+            <a:ext cx="8782470" cy="5969784"/>
+          </a:xfrm>
+          <a:prstGeom prst="rect">
+            <a:avLst/>
+          </a:prstGeom>
+        </p:spPr>
+      </p:pic>
+      <p:pic>
+        <p:nvPicPr>
+          <p:cNvPr id="67" name="Picture 66">
+            <a:extLst>
+              <a:ext uri="{FF2B5EF4-FFF2-40B4-BE49-F238E27FC236}">
+                <a16:creationId xmlns:a16="http://schemas.microsoft.com/office/drawing/2014/main" id="{A07035F9-83C7-2043-AA1C-25E2931A511F}"/>
+              </a:ext>
+            </a:extLst>
+          </p:cNvPr>
+          <p:cNvPicPr>
+            <a:picLocks noChangeAspect="1"/>
+          </p:cNvPicPr>
+          <p:nvPr/>
+        </p:nvPicPr>
+        <p:blipFill>
+          <a:blip r:embed="rId5">
+            <a:extLst>
+              <a:ext uri="{28A0092B-C50C-407E-A947-70E740481C1C}">
+                <a14:useLocalDpi xmlns:a14="http://schemas.microsoft.com/office/drawing/2010/main" val="0"/>
+              </a:ext>
+            </a:extLst>
+          </a:blip>
+          <a:stretch>
+            <a:fillRect/>
+          </a:stretch>
+        </p:blipFill>
+        <p:spPr>
+          <a:xfrm>
+            <a:off x="21923829" y="7612516"/>
+            <a:ext cx="10465652" cy="4413227"/>
+          </a:xfrm>
+          <a:prstGeom prst="rect">
+            <a:avLst/>
+          </a:prstGeom>
+        </p:spPr>
+      </p:pic>
       <p:sp>
         <p:nvSpPr>
           <p:cNvPr id="2" name="Rectangle 1">
@@ -4223,7 +4415,7 @@
           <p:nvPr/>
         </p:nvPicPr>
         <p:blipFill>
-          <a:blip r:embed="rId2">
+          <a:blip r:embed="rId6">
             <a:extLst>
               <a:ext uri="{28A0092B-C50C-407E-A947-70E740481C1C}">
                 <a14:useLocalDpi xmlns:a14="http://schemas.microsoft.com/office/drawing/2010/main" val="0"/>
@@ -4497,7 +4689,7 @@
         </p:nvSpPr>
         <p:spPr>
           <a:xfrm>
-            <a:off x="21771" y="12649200"/>
+            <a:off x="-10886" y="10101680"/>
             <a:ext cx="10972800" cy="1107996"/>
           </a:xfrm>
           <a:prstGeom prst="rect">
@@ -4538,7 +4730,7 @@
         </p:nvSpPr>
         <p:spPr>
           <a:xfrm>
-            <a:off x="21945600" y="16845489"/>
+            <a:off x="21945600" y="16280849"/>
             <a:ext cx="10972800" cy="2123658"/>
           </a:xfrm>
           <a:prstGeom prst="rect">
@@ -4588,7 +4780,7 @@
         </p:nvSpPr>
         <p:spPr>
           <a:xfrm>
-            <a:off x="21945600" y="12649200"/>
+            <a:off x="21945600" y="12084560"/>
             <a:ext cx="10972800" cy="1107996"/>
           </a:xfrm>
           <a:prstGeom prst="rect">
@@ -4672,7 +4864,7 @@
         </p:nvCxnSpPr>
         <p:spPr>
           <a:xfrm flipH="1">
-            <a:off x="819150" y="13766491"/>
+            <a:off x="786493" y="11218971"/>
             <a:ext cx="9144000" cy="0"/>
           </a:xfrm>
           <a:prstGeom prst="line">
@@ -4801,7 +4993,7 @@
         </p:nvCxnSpPr>
         <p:spPr>
           <a:xfrm flipH="1">
-            <a:off x="22955250" y="13766491"/>
+            <a:off x="22955250" y="13201851"/>
             <a:ext cx="9144000" cy="0"/>
           </a:xfrm>
           <a:prstGeom prst="line">
@@ -4844,7 +5036,7 @@
         </p:nvCxnSpPr>
         <p:spPr>
           <a:xfrm flipH="1">
-            <a:off x="22955250" y="18969147"/>
+            <a:off x="22955250" y="18404507"/>
             <a:ext cx="9144000" cy="0"/>
           </a:xfrm>
           <a:prstGeom prst="line">
@@ -4885,8 +5077,8 @@
         </p:nvSpPr>
         <p:spPr>
           <a:xfrm>
-            <a:off x="22860000" y="19081632"/>
-            <a:ext cx="9239250" cy="2616101"/>
+            <a:off x="22860000" y="18516992"/>
+            <a:ext cx="9239250" cy="3539430"/>
           </a:xfrm>
           <a:prstGeom prst="rect">
             <a:avLst/>
@@ -4900,80 +5092,80 @@
           <a:lstStyle/>
           <a:p>
             <a:r>
-              <a:rPr lang="en-US" sz="2800" dirty="0">
+              <a:rPr lang="en-US" sz="3600" dirty="0">
                 <a:latin typeface="Arial" panose="020B0604020202020204" pitchFamily="34" charset="0"/>
               </a:rPr>
               <a:t>We would like to thank our mentors Anirudh Allam, Thomas </a:t>
             </a:r>
             <a:r>
-              <a:rPr lang="en-US" sz="2800" dirty="0" err="1">
+              <a:rPr lang="en-US" sz="3600" dirty="0" err="1">
                 <a:latin typeface="Arial" panose="020B0604020202020204" pitchFamily="34" charset="0"/>
               </a:rPr>
               <a:t>Navidi</a:t>
             </a:r>
             <a:r>
-              <a:rPr lang="en-US" sz="2800" dirty="0">
+              <a:rPr lang="en-US" sz="3600" dirty="0">
                 <a:latin typeface="Arial" panose="020B0604020202020204" pitchFamily="34" charset="0"/>
               </a:rPr>
               <a:t>, Simona </a:t>
             </a:r>
             <a:r>
-              <a:rPr lang="en-US" sz="2800" dirty="0" err="1">
+              <a:rPr lang="en-US" sz="3600" dirty="0" err="1">
                 <a:latin typeface="Arial" panose="020B0604020202020204" pitchFamily="34" charset="0"/>
               </a:rPr>
               <a:t>Onori</a:t>
             </a:r>
             <a:r>
-              <a:rPr lang="en-US" sz="2800" dirty="0">
+              <a:rPr lang="en-US" sz="3600" dirty="0">
                 <a:latin typeface="Arial" panose="020B0604020202020204" pitchFamily="34" charset="0"/>
               </a:rPr>
-              <a:t>, Ram Rajagopal, and Abbas El Gamal for all their support.</a:t>
-            </a:r>
-          </a:p>
-          <a:p>
-            <a:endParaRPr lang="en-US" sz="2000" dirty="0">
+              <a:t>, Ram Rajagopal, and Abbas El Gamal.</a:t>
+            </a:r>
+          </a:p>
+          <a:p>
+            <a:endParaRPr lang="en-US" sz="1200" dirty="0">
               <a:latin typeface="Arial" panose="020B0604020202020204" pitchFamily="34" charset="0"/>
             </a:endParaRPr>
           </a:p>
           <a:p>
             <a:r>
-              <a:rPr lang="en-US" sz="2000" dirty="0">
+              <a:rPr lang="en-US" sz="2400" dirty="0">
                 <a:latin typeface="Arial" panose="020B0604020202020204" pitchFamily="34" charset="0"/>
               </a:rPr>
               <a:t>1. </a:t>
             </a:r>
             <a:r>
-              <a:rPr lang="en-US" sz="2000" dirty="0" err="1">
+              <a:rPr lang="en-US" sz="2400" dirty="0" err="1">
                 <a:latin typeface="Arial" panose="020B0604020202020204" pitchFamily="34" charset="0"/>
               </a:rPr>
               <a:t>Taborelli</a:t>
             </a:r>
             <a:r>
-              <a:rPr lang="en-US" sz="2000" dirty="0">
+              <a:rPr lang="en-US" sz="2400" dirty="0">
                 <a:latin typeface="Arial" panose="020B0604020202020204" pitchFamily="34" charset="0"/>
               </a:rPr>
               <a:t>, Carlo, and Simona </a:t>
             </a:r>
             <a:r>
-              <a:rPr lang="en-US" sz="2000" dirty="0" err="1">
+              <a:rPr lang="en-US" sz="2400" dirty="0" err="1">
                 <a:latin typeface="Arial" panose="020B0604020202020204" pitchFamily="34" charset="0"/>
               </a:rPr>
               <a:t>Onori</a:t>
             </a:r>
             <a:r>
-              <a:rPr lang="en-US" sz="2000" dirty="0">
+              <a:rPr lang="en-US" sz="2400" dirty="0">
                 <a:latin typeface="Arial" panose="020B0604020202020204" pitchFamily="34" charset="0"/>
               </a:rPr>
               <a:t>. "State of charge estimation using extended Kalman filters for battery management system." </a:t>
             </a:r>
             <a:r>
-              <a:rPr lang="en-US" sz="2000" i="1" dirty="0">
+              <a:rPr lang="en-US" sz="2400" i="1" dirty="0">
                 <a:latin typeface="Arial" panose="020B0604020202020204" pitchFamily="34" charset="0"/>
               </a:rPr>
               <a:t>2014 IEEE International Electric Vehicle Conference (IEVC)</a:t>
             </a:r>
             <a:r>
-              <a:rPr lang="en-US" sz="2000" dirty="0">
+              <a:rPr lang="en-US" sz="2400" dirty="0">
                 <a:latin typeface="Arial" panose="020B0604020202020204" pitchFamily="34" charset="0"/>
               </a:rPr>
               <a:t>. IEEE, 2014.</a:t>
@@ -4995,7 +5187,7 @@
         </p:nvSpPr>
         <p:spPr>
           <a:xfrm>
-            <a:off x="22812375" y="13874829"/>
+            <a:off x="22812375" y="13310189"/>
             <a:ext cx="9239250" cy="2862322"/>
           </a:xfrm>
           <a:prstGeom prst="rect">
@@ -5013,7 +5205,7 @@
               <a:rPr lang="en-US" sz="3600" dirty="0">
                 <a:latin typeface="Arial" panose="020B0604020202020204" pitchFamily="34" charset="0"/>
               </a:rPr>
-              <a:t>While this work has shown promise in ML models, two important next steps are determining (1) the architecture best suited to the task and (2) the approach’s generalizability to more use cases.</a:t>
+              <a:t>This work has shown promise in ML models, but two important next steps are determining the architecture best suited to the task and the approach’s generalizability to more use cases.</a:t>
             </a:r>
           </a:p>
         </p:txBody>
@@ -5033,7 +5225,7 @@
         <p:spPr>
           <a:xfrm>
             <a:off x="22907625" y="5548014"/>
-            <a:ext cx="9239250" cy="646331"/>
+            <a:ext cx="9239250" cy="1754326"/>
           </a:xfrm>
           <a:prstGeom prst="rect">
             <a:avLst/>
@@ -5054,7 +5246,7 @@
               <a:rPr lang="en-US" sz="3600" dirty="0">
                 <a:latin typeface="Arial" panose="020B0604020202020204" pitchFamily="34" charset="0"/>
               </a:rPr>
-              <a:t>Summarize key takeaways </a:t>
+              <a:t>ML models work, demonstrating lower cost (squared error) on every run in the validation set versus the circuit model</a:t>
             </a:r>
             <a:endParaRPr lang="en-US" sz="1600" dirty="0">
               <a:latin typeface="Arial" panose="020B0604020202020204" pitchFamily="34" charset="0"/>
@@ -5077,7 +5269,7 @@
         <p:spPr>
           <a:xfrm>
             <a:off x="11839575" y="5548014"/>
-            <a:ext cx="9239250" cy="2862322"/>
+            <a:ext cx="9239250" cy="3970318"/>
           </a:xfrm>
           <a:prstGeom prst="rect">
             <a:avLst/>
@@ -5098,7 +5290,7 @@
               <a:rPr lang="en-US" sz="3600" dirty="0">
                 <a:latin typeface="Arial" panose="020B0604020202020204" pitchFamily="34" charset="0"/>
               </a:rPr>
-              <a:t>Describe experiments </a:t>
+              <a:t>Our data was discharge cycles of six NCR18650B cells at three temperatures for five constant discharge cycles and three real world drive cycles </a:t>
             </a:r>
           </a:p>
           <a:p>
@@ -5110,19 +5302,7 @@
               <a:rPr lang="en-US" sz="3600" dirty="0">
                 <a:latin typeface="Arial" panose="020B0604020202020204" pitchFamily="34" charset="0"/>
               </a:rPr>
-              <a:t>Identify each key takeaway and illustrate with results </a:t>
-            </a:r>
-          </a:p>
-          <a:p>
-            <a:pPr marL="571500" indent="-571500">
-              <a:buFont typeface="Arial" panose="020B0604020202020204" pitchFamily="34" charset="0"/>
-              <a:buChar char="•"/>
-            </a:pPr>
-            <a:r>
-              <a:rPr lang="en-US" sz="3600" dirty="0">
-                <a:latin typeface="Arial" panose="020B0604020202020204" pitchFamily="34" charset="0"/>
-              </a:rPr>
-              <a:t>Ideally each result has an accompanying figure or plot</a:t>
+              <a:t>Key takeaway: ML models perform well, outperforming the circuit model in modeling complex drive cycle behavior</a:t>
             </a:r>
           </a:p>
         </p:txBody>
@@ -5142,7 +5322,7 @@
         <p:spPr>
           <a:xfrm>
             <a:off x="888546" y="5548014"/>
-            <a:ext cx="9239250" cy="2862322"/>
+            <a:ext cx="9239250" cy="4524315"/>
           </a:xfrm>
           <a:prstGeom prst="rect">
             <a:avLst/>
@@ -5163,7 +5343,7 @@
               <a:rPr lang="en-US" sz="3600" dirty="0">
                 <a:latin typeface="Arial" panose="020B0604020202020204" pitchFamily="34" charset="0"/>
               </a:rPr>
-              <a:t>What is the key challenge your addressing in your project? </a:t>
+              <a:t>Our project aims to address whether ML can be used to model battery voltage</a:t>
             </a:r>
           </a:p>
           <a:p>
@@ -5175,7 +5355,7 @@
               <a:rPr lang="en-US" sz="3600" dirty="0">
                 <a:latin typeface="Arial" panose="020B0604020202020204" pitchFamily="34" charset="0"/>
               </a:rPr>
-              <a:t>Why is it relevant? </a:t>
+              <a:t>Physics models are state of the art, but computational limits cause traditional circuit model to be used in practice</a:t>
             </a:r>
           </a:p>
           <a:p>
@@ -5187,19 +5367,7 @@
               <a:rPr lang="en-US" sz="3600" dirty="0">
                 <a:latin typeface="Arial" panose="020B0604020202020204" pitchFamily="34" charset="0"/>
               </a:rPr>
-              <a:t>What is the state of the art? </a:t>
-            </a:r>
-          </a:p>
-          <a:p>
-            <a:pPr marL="571500" indent="-571500">
-              <a:buFont typeface="Arial" panose="020B0604020202020204" pitchFamily="34" charset="0"/>
-              <a:buChar char="•"/>
-            </a:pPr>
-            <a:r>
-              <a:rPr lang="en-US" sz="3600" dirty="0">
-                <a:latin typeface="Arial" panose="020B0604020202020204" pitchFamily="34" charset="0"/>
-              </a:rPr>
-              <a:t>What is the potential impact? </a:t>
+              <a:t>We hope ML may be more accurate than circuit models and more computationally feasible than physics models</a:t>
             </a:r>
           </a:p>
         </p:txBody>
@@ -5218,8 +5386,8 @@
         </p:nvSpPr>
         <p:spPr>
           <a:xfrm>
-            <a:off x="771525" y="13874829"/>
-            <a:ext cx="9239250" cy="3416320"/>
+            <a:off x="738868" y="11327309"/>
+            <a:ext cx="9239250" cy="10618291"/>
           </a:xfrm>
           <a:prstGeom prst="rect">
             <a:avLst/>
@@ -5240,7 +5408,7 @@
               <a:rPr lang="en-US" sz="3600" dirty="0">
                 <a:latin typeface="Arial" panose="020B0604020202020204" pitchFamily="34" charset="0"/>
               </a:rPr>
-              <a:t>Describe succinctly your approach </a:t>
+              <a:t>We compare performance of ML models with circuit models, so we ensure the ML models use the same inputs (I and SoC)</a:t>
             </a:r>
           </a:p>
           <a:p>
@@ -5248,27 +5416,856 @@
               <a:buFont typeface="Arial" panose="020B0604020202020204" pitchFamily="34" charset="0"/>
               <a:buChar char="•"/>
             </a:pPr>
-            <a:r>
-              <a:rPr lang="en-US" sz="3600" dirty="0">
-                <a:latin typeface="Arial" panose="020B0604020202020204" pitchFamily="34" charset="0"/>
-              </a:rPr>
-              <a:t>Describe inputs/outputs/data/components/tools (e.g. BDS) utilized</a:t>
-            </a:r>
+            <a:endParaRPr lang="en-US" sz="3600" dirty="0">
+              <a:latin typeface="Arial" panose="020B0604020202020204" pitchFamily="34" charset="0"/>
+            </a:endParaRPr>
           </a:p>
           <a:p>
             <a:pPr marL="571500" indent="-571500">
               <a:buFont typeface="Arial" panose="020B0604020202020204" pitchFamily="34" charset="0"/>
               <a:buChar char="•"/>
             </a:pPr>
+            <a:endParaRPr lang="en-US" sz="3600" dirty="0">
+              <a:latin typeface="Arial" panose="020B0604020202020204" pitchFamily="34" charset="0"/>
+            </a:endParaRPr>
+          </a:p>
+          <a:p>
+            <a:pPr marL="571500" indent="-571500">
+              <a:buFont typeface="Arial" panose="020B0604020202020204" pitchFamily="34" charset="0"/>
+              <a:buChar char="•"/>
+            </a:pPr>
+            <a:endParaRPr lang="en-US" sz="3600" dirty="0">
+              <a:latin typeface="Arial" panose="020B0604020202020204" pitchFamily="34" charset="0"/>
+            </a:endParaRPr>
+          </a:p>
+          <a:p>
+            <a:pPr marL="571500" indent="-571500">
+              <a:buFont typeface="Arial" panose="020B0604020202020204" pitchFamily="34" charset="0"/>
+              <a:buChar char="•"/>
+            </a:pPr>
+            <a:endParaRPr lang="en-US" sz="3600" dirty="0">
+              <a:latin typeface="Arial" panose="020B0604020202020204" pitchFamily="34" charset="0"/>
+            </a:endParaRPr>
+          </a:p>
+          <a:p>
+            <a:pPr marL="571500" indent="-571500">
+              <a:buFont typeface="Arial" panose="020B0604020202020204" pitchFamily="34" charset="0"/>
+              <a:buChar char="•"/>
+            </a:pPr>
+            <a:endParaRPr lang="en-US" sz="3600" dirty="0">
+              <a:latin typeface="Arial" panose="020B0604020202020204" pitchFamily="34" charset="0"/>
+            </a:endParaRPr>
+          </a:p>
+          <a:p>
+            <a:pPr marL="571500" indent="-571500">
+              <a:buFont typeface="Arial" panose="020B0604020202020204" pitchFamily="34" charset="0"/>
+              <a:buChar char="•"/>
+            </a:pPr>
+            <a:endParaRPr lang="en-US" sz="3600" dirty="0">
+              <a:latin typeface="Arial" panose="020B0604020202020204" pitchFamily="34" charset="0"/>
+            </a:endParaRPr>
+          </a:p>
+          <a:p>
+            <a:pPr marL="571500" indent="-571500">
+              <a:buFont typeface="Arial" panose="020B0604020202020204" pitchFamily="34" charset="0"/>
+              <a:buChar char="•"/>
+            </a:pPr>
+            <a:endParaRPr lang="en-US" sz="3600" dirty="0">
+              <a:latin typeface="Arial" panose="020B0604020202020204" pitchFamily="34" charset="0"/>
+            </a:endParaRPr>
+          </a:p>
+          <a:p>
+            <a:pPr marL="571500" indent="-571500">
+              <a:buFont typeface="Arial" panose="020B0604020202020204" pitchFamily="34" charset="0"/>
+              <a:buChar char="•"/>
+            </a:pPr>
+            <a:endParaRPr lang="en-US" sz="3600" dirty="0">
+              <a:latin typeface="Arial" panose="020B0604020202020204" pitchFamily="34" charset="0"/>
+            </a:endParaRPr>
+          </a:p>
+          <a:p>
+            <a:pPr marL="571500" indent="-571500">
+              <a:buFont typeface="Arial" panose="020B0604020202020204" pitchFamily="34" charset="0"/>
+              <a:buChar char="•"/>
+            </a:pPr>
+            <a:endParaRPr lang="en-US" sz="3600" dirty="0">
+              <a:latin typeface="Arial" panose="020B0604020202020204" pitchFamily="34" charset="0"/>
+            </a:endParaRPr>
+          </a:p>
+          <a:p>
+            <a:pPr marL="571500" indent="-571500">
+              <a:buFont typeface="Arial" panose="020B0604020202020204" pitchFamily="34" charset="0"/>
+              <a:buChar char="•"/>
+            </a:pPr>
+            <a:endParaRPr lang="en-US" sz="3600" dirty="0">
+              <a:latin typeface="Arial" panose="020B0604020202020204" pitchFamily="34" charset="0"/>
+            </a:endParaRPr>
+          </a:p>
+          <a:p>
+            <a:pPr marL="571500" indent="-571500">
+              <a:buFont typeface="Arial" panose="020B0604020202020204" pitchFamily="34" charset="0"/>
+              <a:buChar char="•"/>
+            </a:pPr>
+            <a:endParaRPr lang="en-US" sz="3600" dirty="0">
+              <a:latin typeface="Arial" panose="020B0604020202020204" pitchFamily="34" charset="0"/>
+            </a:endParaRPr>
+          </a:p>
+          <a:p>
+            <a:endParaRPr lang="en-US" sz="3600" dirty="0">
+              <a:latin typeface="Arial" panose="020B0604020202020204" pitchFamily="34" charset="0"/>
+            </a:endParaRPr>
+          </a:p>
+          <a:p>
+            <a:endParaRPr lang="en-US" sz="3600" dirty="0">
+              <a:latin typeface="Arial" panose="020B0604020202020204" pitchFamily="34" charset="0"/>
+            </a:endParaRPr>
+          </a:p>
+          <a:p>
+            <a:pPr marL="571500" indent="-571500">
+              <a:buFont typeface="Arial" panose="020B0604020202020204" pitchFamily="34" charset="0"/>
+              <a:buChar char="•"/>
+            </a:pPr>
             <a:r>
               <a:rPr lang="en-US" sz="3600" dirty="0">
                 <a:latin typeface="Arial" panose="020B0604020202020204" pitchFamily="34" charset="0"/>
               </a:rPr>
-              <a:t>Contrast with existing literature/state of the art </a:t>
-            </a:r>
-          </a:p>
-        </p:txBody>
-      </p:sp>
+              <a:t>ML models make different assumptions about the form of V = f(I, SoC) than the circuit model, and learn f from data</a:t>
+            </a:r>
+          </a:p>
+        </p:txBody>
+      </p:sp>
+      <p:grpSp>
+        <p:nvGrpSpPr>
+          <p:cNvPr id="17" name="Group 16">
+            <a:extLst>
+              <a:ext uri="{FF2B5EF4-FFF2-40B4-BE49-F238E27FC236}">
+                <a16:creationId xmlns:a16="http://schemas.microsoft.com/office/drawing/2014/main" id="{F4262788-FE86-5C4A-BA43-37CF616168A7}"/>
+              </a:ext>
+            </a:extLst>
+          </p:cNvPr>
+          <p:cNvGrpSpPr/>
+          <p:nvPr/>
+        </p:nvGrpSpPr>
+        <p:grpSpPr>
+          <a:xfrm>
+            <a:off x="2309607" y="17681670"/>
+            <a:ext cx="6097772" cy="1961987"/>
+            <a:chOff x="2590800" y="14956303"/>
+            <a:chExt cx="5834742" cy="2453816"/>
+          </a:xfrm>
+        </p:grpSpPr>
+        <p:sp>
+          <p:nvSpPr>
+            <p:cNvPr id="3" name="Rectangle 2">
+              <a:extLst>
+                <a:ext uri="{FF2B5EF4-FFF2-40B4-BE49-F238E27FC236}">
+                  <a16:creationId xmlns:a16="http://schemas.microsoft.com/office/drawing/2014/main" id="{3AD924BE-DB2D-3A42-9F10-F7808AC8D717}"/>
+                </a:ext>
+              </a:extLst>
+            </p:cNvPr>
+            <p:cNvSpPr/>
+            <p:nvPr/>
+          </p:nvSpPr>
+          <p:spPr>
+            <a:xfrm>
+              <a:off x="3831771" y="15286460"/>
+              <a:ext cx="3352800" cy="2123659"/>
+            </a:xfrm>
+            <a:prstGeom prst="rect">
+              <a:avLst/>
+            </a:prstGeom>
+            <a:solidFill>
+              <a:schemeClr val="bg1"/>
+            </a:solidFill>
+            <a:ln>
+              <a:solidFill>
+                <a:schemeClr val="tx1"/>
+              </a:solidFill>
+            </a:ln>
+          </p:spPr>
+          <p:style>
+            <a:lnRef idx="2">
+              <a:schemeClr val="accent1">
+                <a:shade val="50000"/>
+              </a:schemeClr>
+            </a:lnRef>
+            <a:fillRef idx="1">
+              <a:schemeClr val="accent1"/>
+            </a:fillRef>
+            <a:effectRef idx="0">
+              <a:schemeClr val="accent1"/>
+            </a:effectRef>
+            <a:fontRef idx="minor">
+              <a:schemeClr val="lt1"/>
+            </a:fontRef>
+          </p:style>
+          <p:txBody>
+            <a:bodyPr rtlCol="0" anchor="ctr"/>
+            <a:lstStyle/>
+            <a:p>
+              <a:pPr algn="ctr"/>
+              <a:r>
+                <a:rPr lang="en-US" sz="3600" dirty="0">
+                  <a:solidFill>
+                    <a:schemeClr val="tx1"/>
+                  </a:solidFill>
+                  <a:latin typeface="Arial" panose="020B0604020202020204" pitchFamily="34" charset="0"/>
+                  <a:cs typeface="Arial" panose="020B0604020202020204" pitchFamily="34" charset="0"/>
+                </a:rPr>
+                <a:t>ML Model</a:t>
+              </a:r>
+            </a:p>
+          </p:txBody>
+        </p:sp>
+        <p:cxnSp>
+          <p:nvCxnSpPr>
+            <p:cNvPr id="29" name="Straight Arrow Connector 28">
+              <a:extLst>
+                <a:ext uri="{FF2B5EF4-FFF2-40B4-BE49-F238E27FC236}">
+                  <a16:creationId xmlns:a16="http://schemas.microsoft.com/office/drawing/2014/main" id="{8C322015-61FB-8341-B84A-5D2B750BAD78}"/>
+                </a:ext>
+              </a:extLst>
+            </p:cNvPr>
+            <p:cNvCxnSpPr/>
+            <p:nvPr/>
+          </p:nvCxnSpPr>
+          <p:spPr>
+            <a:xfrm>
+              <a:off x="7184571" y="16306800"/>
+              <a:ext cx="1240971" cy="0"/>
+            </a:xfrm>
+            <a:prstGeom prst="straightConnector1">
+              <a:avLst/>
+            </a:prstGeom>
+            <a:ln w="76200">
+              <a:solidFill>
+                <a:schemeClr val="tx1"/>
+              </a:solidFill>
+              <a:tailEnd type="triangle"/>
+            </a:ln>
+          </p:spPr>
+          <p:style>
+            <a:lnRef idx="1">
+              <a:schemeClr val="accent1"/>
+            </a:lnRef>
+            <a:fillRef idx="0">
+              <a:schemeClr val="accent1"/>
+            </a:fillRef>
+            <a:effectRef idx="0">
+              <a:schemeClr val="accent1"/>
+            </a:effectRef>
+            <a:fontRef idx="minor">
+              <a:schemeClr val="tx1"/>
+            </a:fontRef>
+          </p:style>
+        </p:cxnSp>
+        <p:sp>
+          <p:nvSpPr>
+            <p:cNvPr id="10" name="TextBox 9">
+              <a:extLst>
+                <a:ext uri="{FF2B5EF4-FFF2-40B4-BE49-F238E27FC236}">
+                  <a16:creationId xmlns:a16="http://schemas.microsoft.com/office/drawing/2014/main" id="{69CC321C-FD5F-9945-A8DC-7D531525F126}"/>
+                </a:ext>
+              </a:extLst>
+            </p:cNvPr>
+            <p:cNvSpPr txBox="1"/>
+            <p:nvPr/>
+          </p:nvSpPr>
+          <p:spPr>
+            <a:xfrm>
+              <a:off x="7558835" y="15485677"/>
+              <a:ext cx="492443" cy="646331"/>
+            </a:xfrm>
+            <a:prstGeom prst="rect">
+              <a:avLst/>
+            </a:prstGeom>
+            <a:noFill/>
+          </p:spPr>
+          <p:txBody>
+            <a:bodyPr wrap="none" rtlCol="0">
+              <a:spAutoFit/>
+            </a:bodyPr>
+            <a:lstStyle/>
+            <a:p>
+              <a:r>
+                <a:rPr lang="en-US" sz="3600" dirty="0">
+                  <a:latin typeface="Arial" panose="020B0604020202020204" pitchFamily="34" charset="0"/>
+                </a:rPr>
+                <a:t>V</a:t>
+              </a:r>
+            </a:p>
+          </p:txBody>
+        </p:sp>
+        <p:cxnSp>
+          <p:nvCxnSpPr>
+            <p:cNvPr id="30" name="Straight Arrow Connector 29">
+              <a:extLst>
+                <a:ext uri="{FF2B5EF4-FFF2-40B4-BE49-F238E27FC236}">
+                  <a16:creationId xmlns:a16="http://schemas.microsoft.com/office/drawing/2014/main" id="{E395CF83-C343-4346-8BBB-F8E663C0211A}"/>
+                </a:ext>
+              </a:extLst>
+            </p:cNvPr>
+            <p:cNvCxnSpPr/>
+            <p:nvPr/>
+          </p:nvCxnSpPr>
+          <p:spPr>
+            <a:xfrm>
+              <a:off x="2590800" y="15826009"/>
+              <a:ext cx="1240971" cy="0"/>
+            </a:xfrm>
+            <a:prstGeom prst="straightConnector1">
+              <a:avLst/>
+            </a:prstGeom>
+            <a:ln w="76200">
+              <a:solidFill>
+                <a:schemeClr val="tx1"/>
+              </a:solidFill>
+              <a:tailEnd type="triangle"/>
+            </a:ln>
+          </p:spPr>
+          <p:style>
+            <a:lnRef idx="1">
+              <a:schemeClr val="accent1"/>
+            </a:lnRef>
+            <a:fillRef idx="0">
+              <a:schemeClr val="accent1"/>
+            </a:fillRef>
+            <a:effectRef idx="0">
+              <a:schemeClr val="accent1"/>
+            </a:effectRef>
+            <a:fontRef idx="minor">
+              <a:schemeClr val="tx1"/>
+            </a:fontRef>
+          </p:style>
+        </p:cxnSp>
+        <p:sp>
+          <p:nvSpPr>
+            <p:cNvPr id="36" name="TextBox 35">
+              <a:extLst>
+                <a:ext uri="{FF2B5EF4-FFF2-40B4-BE49-F238E27FC236}">
+                  <a16:creationId xmlns:a16="http://schemas.microsoft.com/office/drawing/2014/main" id="{251DEAA1-3012-F94E-864D-BFBC6A35049F}"/>
+                </a:ext>
+              </a:extLst>
+            </p:cNvPr>
+            <p:cNvSpPr txBox="1"/>
+            <p:nvPr/>
+          </p:nvSpPr>
+          <p:spPr>
+            <a:xfrm>
+              <a:off x="2952499" y="14956303"/>
+              <a:ext cx="312906" cy="646331"/>
+            </a:xfrm>
+            <a:prstGeom prst="rect">
+              <a:avLst/>
+            </a:prstGeom>
+            <a:noFill/>
+          </p:spPr>
+          <p:txBody>
+            <a:bodyPr wrap="none" rtlCol="0">
+              <a:spAutoFit/>
+            </a:bodyPr>
+            <a:lstStyle/>
+            <a:p>
+              <a:r>
+                <a:rPr lang="en-US" sz="3600" dirty="0">
+                  <a:latin typeface="Arial" panose="020B0604020202020204" pitchFamily="34" charset="0"/>
+                </a:rPr>
+                <a:t>I</a:t>
+              </a:r>
+            </a:p>
+          </p:txBody>
+        </p:sp>
+        <p:cxnSp>
+          <p:nvCxnSpPr>
+            <p:cNvPr id="37" name="Straight Arrow Connector 36">
+              <a:extLst>
+                <a:ext uri="{FF2B5EF4-FFF2-40B4-BE49-F238E27FC236}">
+                  <a16:creationId xmlns:a16="http://schemas.microsoft.com/office/drawing/2014/main" id="{A3D50A9F-6C10-6A41-8E3B-178C180C80B8}"/>
+                </a:ext>
+              </a:extLst>
+            </p:cNvPr>
+            <p:cNvCxnSpPr/>
+            <p:nvPr/>
+          </p:nvCxnSpPr>
+          <p:spPr>
+            <a:xfrm>
+              <a:off x="2590800" y="16896219"/>
+              <a:ext cx="1240971" cy="0"/>
+            </a:xfrm>
+            <a:prstGeom prst="straightConnector1">
+              <a:avLst/>
+            </a:prstGeom>
+            <a:ln w="76200">
+              <a:solidFill>
+                <a:schemeClr val="tx1"/>
+              </a:solidFill>
+              <a:tailEnd type="triangle"/>
+            </a:ln>
+          </p:spPr>
+          <p:style>
+            <a:lnRef idx="1">
+              <a:schemeClr val="accent1"/>
+            </a:lnRef>
+            <a:fillRef idx="0">
+              <a:schemeClr val="accent1"/>
+            </a:fillRef>
+            <a:effectRef idx="0">
+              <a:schemeClr val="accent1"/>
+            </a:effectRef>
+            <a:fontRef idx="minor">
+              <a:schemeClr val="tx1"/>
+            </a:fontRef>
+          </p:style>
+        </p:cxnSp>
+        <p:sp>
+          <p:nvSpPr>
+            <p:cNvPr id="38" name="TextBox 37">
+              <a:extLst>
+                <a:ext uri="{FF2B5EF4-FFF2-40B4-BE49-F238E27FC236}">
+                  <a16:creationId xmlns:a16="http://schemas.microsoft.com/office/drawing/2014/main" id="{08040043-FCBB-1841-B73A-543B506A7848}"/>
+                </a:ext>
+              </a:extLst>
+            </p:cNvPr>
+            <p:cNvSpPr txBox="1"/>
+            <p:nvPr/>
+          </p:nvSpPr>
+          <p:spPr>
+            <a:xfrm>
+              <a:off x="2672190" y="16074133"/>
+              <a:ext cx="1082348" cy="646331"/>
+            </a:xfrm>
+            <a:prstGeom prst="rect">
+              <a:avLst/>
+            </a:prstGeom>
+            <a:noFill/>
+          </p:spPr>
+          <p:txBody>
+            <a:bodyPr wrap="none" rtlCol="0">
+              <a:spAutoFit/>
+            </a:bodyPr>
+            <a:lstStyle/>
+            <a:p>
+              <a:r>
+                <a:rPr lang="en-US" sz="3600" dirty="0">
+                  <a:latin typeface="Arial" panose="020B0604020202020204" pitchFamily="34" charset="0"/>
+                </a:rPr>
+                <a:t>SoC</a:t>
+              </a:r>
+            </a:p>
+          </p:txBody>
+        </p:sp>
+      </p:grpSp>
+      <p:grpSp>
+        <p:nvGrpSpPr>
+          <p:cNvPr id="53" name="Group 52">
+            <a:extLst>
+              <a:ext uri="{FF2B5EF4-FFF2-40B4-BE49-F238E27FC236}">
+                <a16:creationId xmlns:a16="http://schemas.microsoft.com/office/drawing/2014/main" id="{83CE4B7E-C7DD-534E-B8CE-1267CA23E5BD}"/>
+              </a:ext>
+            </a:extLst>
+          </p:cNvPr>
+          <p:cNvGrpSpPr/>
+          <p:nvPr/>
+        </p:nvGrpSpPr>
+        <p:grpSpPr>
+          <a:xfrm>
+            <a:off x="2266064" y="13086576"/>
+            <a:ext cx="6097772" cy="1961987"/>
+            <a:chOff x="2309607" y="14553232"/>
+            <a:chExt cx="6097772" cy="1961987"/>
+          </a:xfrm>
+        </p:grpSpPr>
+        <p:grpSp>
+          <p:nvGrpSpPr>
+            <p:cNvPr id="43" name="Group 42">
+              <a:extLst>
+                <a:ext uri="{FF2B5EF4-FFF2-40B4-BE49-F238E27FC236}">
+                  <a16:creationId xmlns:a16="http://schemas.microsoft.com/office/drawing/2014/main" id="{208B1AEC-D9B1-B044-871A-B650822E63CA}"/>
+                </a:ext>
+              </a:extLst>
+            </p:cNvPr>
+            <p:cNvGrpSpPr/>
+            <p:nvPr/>
+          </p:nvGrpSpPr>
+          <p:grpSpPr>
+            <a:xfrm>
+              <a:off x="2309607" y="14553232"/>
+              <a:ext cx="6097772" cy="1961987"/>
+              <a:chOff x="2590800" y="14956303"/>
+              <a:chExt cx="5834742" cy="2453816"/>
+            </a:xfrm>
+          </p:grpSpPr>
+          <p:sp>
+            <p:nvSpPr>
+              <p:cNvPr id="44" name="Rectangle 43">
+                <a:extLst>
+                  <a:ext uri="{FF2B5EF4-FFF2-40B4-BE49-F238E27FC236}">
+                    <a16:creationId xmlns:a16="http://schemas.microsoft.com/office/drawing/2014/main" id="{1F9F3ED7-74E7-B144-AB2E-8BF363EB533D}"/>
+                  </a:ext>
+                </a:extLst>
+              </p:cNvPr>
+              <p:cNvSpPr/>
+              <p:nvPr/>
+            </p:nvSpPr>
+            <p:spPr>
+              <a:xfrm>
+                <a:off x="3831771" y="15286460"/>
+                <a:ext cx="3352800" cy="2123659"/>
+              </a:xfrm>
+              <a:prstGeom prst="rect">
+                <a:avLst/>
+              </a:prstGeom>
+              <a:solidFill>
+                <a:schemeClr val="bg1"/>
+              </a:solidFill>
+              <a:ln>
+                <a:solidFill>
+                  <a:schemeClr val="tx1"/>
+                </a:solidFill>
+              </a:ln>
+            </p:spPr>
+            <p:style>
+              <a:lnRef idx="2">
+                <a:schemeClr val="accent1">
+                  <a:shade val="50000"/>
+                </a:schemeClr>
+              </a:lnRef>
+              <a:fillRef idx="1">
+                <a:schemeClr val="accent1"/>
+              </a:fillRef>
+              <a:effectRef idx="0">
+                <a:schemeClr val="accent1"/>
+              </a:effectRef>
+              <a:fontRef idx="minor">
+                <a:schemeClr val="lt1"/>
+              </a:fontRef>
+            </p:style>
+            <p:txBody>
+              <a:bodyPr rtlCol="0" anchor="ctr"/>
+              <a:lstStyle/>
+              <a:p>
+                <a:pPr algn="ctr"/>
+                <a:endParaRPr lang="en-US" sz="3600" dirty="0">
+                  <a:solidFill>
+                    <a:schemeClr val="tx1"/>
+                  </a:solidFill>
+                  <a:latin typeface="Arial" panose="020B0604020202020204" pitchFamily="34" charset="0"/>
+                  <a:cs typeface="Arial" panose="020B0604020202020204" pitchFamily="34" charset="0"/>
+                </a:endParaRPr>
+              </a:p>
+            </p:txBody>
+          </p:sp>
+          <p:cxnSp>
+            <p:nvCxnSpPr>
+              <p:cNvPr id="45" name="Straight Arrow Connector 44">
+                <a:extLst>
+                  <a:ext uri="{FF2B5EF4-FFF2-40B4-BE49-F238E27FC236}">
+                    <a16:creationId xmlns:a16="http://schemas.microsoft.com/office/drawing/2014/main" id="{A6F74CDB-D623-CA4A-A9C1-1DC12F770DE3}"/>
+                  </a:ext>
+                </a:extLst>
+              </p:cNvPr>
+              <p:cNvCxnSpPr/>
+              <p:nvPr/>
+            </p:nvCxnSpPr>
+            <p:spPr>
+              <a:xfrm>
+                <a:off x="7184571" y="16306800"/>
+                <a:ext cx="1240971" cy="0"/>
+              </a:xfrm>
+              <a:prstGeom prst="straightConnector1">
+                <a:avLst/>
+              </a:prstGeom>
+              <a:ln w="76200">
+                <a:solidFill>
+                  <a:schemeClr val="tx1"/>
+                </a:solidFill>
+                <a:tailEnd type="triangle"/>
+              </a:ln>
+            </p:spPr>
+            <p:style>
+              <a:lnRef idx="1">
+                <a:schemeClr val="accent1"/>
+              </a:lnRef>
+              <a:fillRef idx="0">
+                <a:schemeClr val="accent1"/>
+              </a:fillRef>
+              <a:effectRef idx="0">
+                <a:schemeClr val="accent1"/>
+              </a:effectRef>
+              <a:fontRef idx="minor">
+                <a:schemeClr val="tx1"/>
+              </a:fontRef>
+            </p:style>
+          </p:cxnSp>
+          <p:sp>
+            <p:nvSpPr>
+              <p:cNvPr id="46" name="TextBox 45">
+                <a:extLst>
+                  <a:ext uri="{FF2B5EF4-FFF2-40B4-BE49-F238E27FC236}">
+                    <a16:creationId xmlns:a16="http://schemas.microsoft.com/office/drawing/2014/main" id="{E6A793D4-4347-344C-8D7A-D64112AFCF9D}"/>
+                  </a:ext>
+                </a:extLst>
+              </p:cNvPr>
+              <p:cNvSpPr txBox="1"/>
+              <p:nvPr/>
+            </p:nvSpPr>
+            <p:spPr>
+              <a:xfrm>
+                <a:off x="7558835" y="15485677"/>
+                <a:ext cx="492443" cy="646331"/>
+              </a:xfrm>
+              <a:prstGeom prst="rect">
+                <a:avLst/>
+              </a:prstGeom>
+              <a:noFill/>
+            </p:spPr>
+            <p:txBody>
+              <a:bodyPr wrap="none" rtlCol="0">
+                <a:spAutoFit/>
+              </a:bodyPr>
+              <a:lstStyle/>
+              <a:p>
+                <a:r>
+                  <a:rPr lang="en-US" sz="3600" dirty="0">
+                    <a:latin typeface="Arial" panose="020B0604020202020204" pitchFamily="34" charset="0"/>
+                  </a:rPr>
+                  <a:t>V</a:t>
+                </a:r>
+              </a:p>
+            </p:txBody>
+          </p:sp>
+          <p:cxnSp>
+            <p:nvCxnSpPr>
+              <p:cNvPr id="47" name="Straight Arrow Connector 46">
+                <a:extLst>
+                  <a:ext uri="{FF2B5EF4-FFF2-40B4-BE49-F238E27FC236}">
+                    <a16:creationId xmlns:a16="http://schemas.microsoft.com/office/drawing/2014/main" id="{3B020371-58C2-C847-8C52-A06845821045}"/>
+                  </a:ext>
+                </a:extLst>
+              </p:cNvPr>
+              <p:cNvCxnSpPr/>
+              <p:nvPr/>
+            </p:nvCxnSpPr>
+            <p:spPr>
+              <a:xfrm>
+                <a:off x="2590800" y="15826009"/>
+                <a:ext cx="1240971" cy="0"/>
+              </a:xfrm>
+              <a:prstGeom prst="straightConnector1">
+                <a:avLst/>
+              </a:prstGeom>
+              <a:ln w="76200">
+                <a:solidFill>
+                  <a:schemeClr val="tx1"/>
+                </a:solidFill>
+                <a:tailEnd type="triangle"/>
+              </a:ln>
+            </p:spPr>
+            <p:style>
+              <a:lnRef idx="1">
+                <a:schemeClr val="accent1"/>
+              </a:lnRef>
+              <a:fillRef idx="0">
+                <a:schemeClr val="accent1"/>
+              </a:fillRef>
+              <a:effectRef idx="0">
+                <a:schemeClr val="accent1"/>
+              </a:effectRef>
+              <a:fontRef idx="minor">
+                <a:schemeClr val="tx1"/>
+              </a:fontRef>
+            </p:style>
+          </p:cxnSp>
+          <p:sp>
+            <p:nvSpPr>
+              <p:cNvPr id="48" name="TextBox 47">
+                <a:extLst>
+                  <a:ext uri="{FF2B5EF4-FFF2-40B4-BE49-F238E27FC236}">
+                    <a16:creationId xmlns:a16="http://schemas.microsoft.com/office/drawing/2014/main" id="{6918055A-35BC-A046-B0B9-A4EF80380896}"/>
+                  </a:ext>
+                </a:extLst>
+              </p:cNvPr>
+              <p:cNvSpPr txBox="1"/>
+              <p:nvPr/>
+            </p:nvSpPr>
+            <p:spPr>
+              <a:xfrm>
+                <a:off x="2952499" y="14956303"/>
+                <a:ext cx="312906" cy="646331"/>
+              </a:xfrm>
+              <a:prstGeom prst="rect">
+                <a:avLst/>
+              </a:prstGeom>
+              <a:noFill/>
+            </p:spPr>
+            <p:txBody>
+              <a:bodyPr wrap="none" rtlCol="0">
+                <a:spAutoFit/>
+              </a:bodyPr>
+              <a:lstStyle/>
+              <a:p>
+                <a:r>
+                  <a:rPr lang="en-US" sz="3600" dirty="0">
+                    <a:latin typeface="Arial" panose="020B0604020202020204" pitchFamily="34" charset="0"/>
+                  </a:rPr>
+                  <a:t>I</a:t>
+                </a:r>
+              </a:p>
+            </p:txBody>
+          </p:sp>
+          <p:cxnSp>
+            <p:nvCxnSpPr>
+              <p:cNvPr id="49" name="Straight Arrow Connector 48">
+                <a:extLst>
+                  <a:ext uri="{FF2B5EF4-FFF2-40B4-BE49-F238E27FC236}">
+                    <a16:creationId xmlns:a16="http://schemas.microsoft.com/office/drawing/2014/main" id="{ECADBA77-72B9-BE4A-80DA-9D21A5CF4D5E}"/>
+                  </a:ext>
+                </a:extLst>
+              </p:cNvPr>
+              <p:cNvCxnSpPr/>
+              <p:nvPr/>
+            </p:nvCxnSpPr>
+            <p:spPr>
+              <a:xfrm>
+                <a:off x="2590800" y="16896219"/>
+                <a:ext cx="1240971" cy="0"/>
+              </a:xfrm>
+              <a:prstGeom prst="straightConnector1">
+                <a:avLst/>
+              </a:prstGeom>
+              <a:ln w="76200">
+                <a:solidFill>
+                  <a:schemeClr val="tx1"/>
+                </a:solidFill>
+                <a:tailEnd type="triangle"/>
+              </a:ln>
+            </p:spPr>
+            <p:style>
+              <a:lnRef idx="1">
+                <a:schemeClr val="accent1"/>
+              </a:lnRef>
+              <a:fillRef idx="0">
+                <a:schemeClr val="accent1"/>
+              </a:fillRef>
+              <a:effectRef idx="0">
+                <a:schemeClr val="accent1"/>
+              </a:effectRef>
+              <a:fontRef idx="minor">
+                <a:schemeClr val="tx1"/>
+              </a:fontRef>
+            </p:style>
+          </p:cxnSp>
+          <p:sp>
+            <p:nvSpPr>
+              <p:cNvPr id="50" name="TextBox 49">
+                <a:extLst>
+                  <a:ext uri="{FF2B5EF4-FFF2-40B4-BE49-F238E27FC236}">
+                    <a16:creationId xmlns:a16="http://schemas.microsoft.com/office/drawing/2014/main" id="{9F12412B-1CD5-2B40-8916-61F4F6721AE4}"/>
+                  </a:ext>
+                </a:extLst>
+              </p:cNvPr>
+              <p:cNvSpPr txBox="1"/>
+              <p:nvPr/>
+            </p:nvSpPr>
+            <p:spPr>
+              <a:xfrm>
+                <a:off x="2672190" y="16074133"/>
+                <a:ext cx="1082348" cy="646331"/>
+              </a:xfrm>
+              <a:prstGeom prst="rect">
+                <a:avLst/>
+              </a:prstGeom>
+              <a:noFill/>
+            </p:spPr>
+            <p:txBody>
+              <a:bodyPr wrap="none" rtlCol="0">
+                <a:spAutoFit/>
+              </a:bodyPr>
+              <a:lstStyle/>
+              <a:p>
+                <a:r>
+                  <a:rPr lang="en-US" sz="3600" dirty="0">
+                    <a:latin typeface="Arial" panose="020B0604020202020204" pitchFamily="34" charset="0"/>
+                  </a:rPr>
+                  <a:t>SoC</a:t>
+                </a:r>
+              </a:p>
+            </p:txBody>
+          </p:sp>
+        </p:grpSp>
+        <p:pic>
+          <p:nvPicPr>
+            <p:cNvPr id="52" name="Picture 51">
+              <a:extLst>
+                <a:ext uri="{FF2B5EF4-FFF2-40B4-BE49-F238E27FC236}">
+                  <a16:creationId xmlns:a16="http://schemas.microsoft.com/office/drawing/2014/main" id="{3CB7DDC6-5FE5-2146-8765-EB1BF11EE856}"/>
+                </a:ext>
+              </a:extLst>
+            </p:cNvPr>
+            <p:cNvPicPr>
+              <a:picLocks noChangeAspect="1"/>
+            </p:cNvPicPr>
+            <p:nvPr/>
+          </p:nvPicPr>
+          <p:blipFill>
+            <a:blip r:embed="rId7">
+              <a:extLst>
+                <a:ext uri="{28A0092B-C50C-407E-A947-70E740481C1C}">
+                  <a14:useLocalDpi xmlns:a14="http://schemas.microsoft.com/office/drawing/2010/main" val="0"/>
+                </a:ext>
+              </a:extLst>
+            </a:blip>
+            <a:stretch>
+              <a:fillRect/>
+            </a:stretch>
+          </p:blipFill>
+          <p:spPr>
+            <a:xfrm>
+              <a:off x="3709690" y="14940216"/>
+              <a:ext cx="3362920" cy="1530372"/>
+            </a:xfrm>
+            <a:prstGeom prst="rect">
+              <a:avLst/>
+            </a:prstGeom>
+          </p:spPr>
+        </p:pic>
+      </p:grpSp>
+      <p:pic>
+        <p:nvPicPr>
+          <p:cNvPr id="63" name="Picture 62">
+            <a:extLst>
+              <a:ext uri="{FF2B5EF4-FFF2-40B4-BE49-F238E27FC236}">
+                <a16:creationId xmlns:a16="http://schemas.microsoft.com/office/drawing/2014/main" id="{6B40BBFD-0BA5-204D-B8D8-02C750A6865B}"/>
+              </a:ext>
+            </a:extLst>
+          </p:cNvPr>
+          <p:cNvPicPr>
+            <a:picLocks noChangeAspect="1"/>
+          </p:cNvPicPr>
+          <p:nvPr/>
+        </p:nvPicPr>
+        <p:blipFill>
+          <a:blip r:embed="rId8">
+            <a:extLst>
+              <a:ext uri="{28A0092B-C50C-407E-A947-70E740481C1C}">
+                <a14:useLocalDpi xmlns:a14="http://schemas.microsoft.com/office/drawing/2010/main" val="0"/>
+              </a:ext>
+            </a:extLst>
+          </a:blip>
+          <a:stretch>
+            <a:fillRect/>
+          </a:stretch>
+        </p:blipFill>
+        <p:spPr>
+          <a:xfrm>
+            <a:off x="1411115" y="15191181"/>
+            <a:ext cx="8519378" cy="2377501"/>
+          </a:xfrm>
+          <a:prstGeom prst="rect">
+            <a:avLst/>
+          </a:prstGeom>
+        </p:spPr>
+      </p:pic>
     </p:spTree>
   </p:cSld>
   <p:clrMapOvr>

</xml_diff>

<commit_message>
Updated powerpoints, error vs time plots
</commit_message>
<xml_diff>
--- a/poster/poster.pptx
+++ b/poster/poster.pptx
@@ -549,7 +549,26 @@
           <a:bodyPr/>
           <a:lstStyle/>
           <a:p>
-            <a:endParaRPr lang="en-US" dirty="0"/>
+            <a:r>
+              <a:rPr lang="en-US" dirty="0"/>
+              <a:t>Looking at HPPC … plots voltage </a:t>
+            </a:r>
+            <a:r>
+              <a:rPr lang="en-US" dirty="0" err="1"/>
+              <a:t>pred</a:t>
+            </a:r>
+            <a:r>
+              <a:rPr lang="en-US" dirty="0"/>
+              <a:t> vs time, squared error in </a:t>
+            </a:r>
+            <a:r>
+              <a:rPr lang="en-US" dirty="0" err="1"/>
+              <a:t>pred</a:t>
+            </a:r>
+            <a:r>
+              <a:rPr lang="en-US" dirty="0"/>
+              <a:t> vs time, zoomed plot</a:t>
+            </a:r>
           </a:p>
         </p:txBody>
       </p:sp>
@@ -4268,8 +4287,8 @@
         </p:blipFill>
         <p:spPr>
           <a:xfrm>
-            <a:off x="12122725" y="15952715"/>
-            <a:ext cx="8725097" cy="5969803"/>
+            <a:off x="12505265" y="16575109"/>
+            <a:ext cx="7907869" cy="5410647"/>
           </a:xfrm>
           <a:prstGeom prst="rect">
             <a:avLst/>
@@ -4304,8 +4323,8 @@
         </p:blipFill>
         <p:spPr>
           <a:xfrm>
-            <a:off x="12062415" y="9819129"/>
-            <a:ext cx="8782470" cy="5969784"/>
+            <a:off x="12505265" y="11164479"/>
+            <a:ext cx="7959868" cy="5410630"/>
           </a:xfrm>
           <a:prstGeom prst="rect">
             <a:avLst/>
@@ -4340,7 +4359,7 @@
         </p:blipFill>
         <p:spPr>
           <a:xfrm>
-            <a:off x="21923829" y="7612516"/>
+            <a:off x="22225028" y="10958877"/>
             <a:ext cx="10465652" cy="4413227"/>
           </a:xfrm>
           <a:prstGeom prst="rect">
@@ -4567,7 +4586,7 @@
         <p:spPr>
           <a:xfrm>
             <a:off x="0" y="4322385"/>
-            <a:ext cx="10972800" cy="1107996"/>
+            <a:ext cx="10972800" cy="830997"/>
           </a:xfrm>
           <a:prstGeom prst="rect">
             <a:avLst/>
@@ -4585,7 +4604,7 @@
           <a:p>
             <a:pPr algn="ctr"/>
             <a:r>
-              <a:rPr lang="en-US" sz="6600" dirty="0">
+              <a:rPr lang="en-US" sz="4800" dirty="0">
                 <a:latin typeface="Arial" panose="020B0604020202020204" pitchFamily="34" charset="0"/>
               </a:rPr>
               <a:t>Motivation</a:t>
@@ -4608,7 +4627,7 @@
         <p:spPr>
           <a:xfrm>
             <a:off x="10972802" y="4322385"/>
-            <a:ext cx="10972800" cy="1107996"/>
+            <a:ext cx="10972800" cy="830997"/>
           </a:xfrm>
           <a:prstGeom prst="rect">
             <a:avLst/>
@@ -4626,10 +4645,10 @@
           <a:p>
             <a:pPr algn="ctr"/>
             <a:r>
-              <a:rPr lang="en-US" sz="6600" dirty="0">
+              <a:rPr lang="en-US" sz="4800" dirty="0">
                 <a:latin typeface="Arial" panose="020B0604020202020204" pitchFamily="34" charset="0"/>
               </a:rPr>
-              <a:t>Results</a:t>
+              <a:t>Data</a:t>
             </a:r>
           </a:p>
         </p:txBody>
@@ -4648,8 +4667,8 @@
         </p:nvSpPr>
         <p:spPr>
           <a:xfrm>
-            <a:off x="21945600" y="4322385"/>
-            <a:ext cx="10972800" cy="1107996"/>
+            <a:off x="21971454" y="15272080"/>
+            <a:ext cx="10972800" cy="830997"/>
           </a:xfrm>
           <a:prstGeom prst="rect">
             <a:avLst/>
@@ -4667,7 +4686,7 @@
           <a:p>
             <a:pPr algn="ctr"/>
             <a:r>
-              <a:rPr lang="en-US" sz="6600" dirty="0">
+              <a:rPr lang="en-US" sz="4800" dirty="0">
                 <a:latin typeface="Arial" panose="020B0604020202020204" pitchFamily="34" charset="0"/>
               </a:rPr>
               <a:t>Conclusions</a:t>
@@ -4689,8 +4708,8 @@
         </p:nvSpPr>
         <p:spPr>
           <a:xfrm>
-            <a:off x="-10886" y="10101680"/>
-            <a:ext cx="10972800" cy="1107996"/>
+            <a:off x="21771" y="8584107"/>
+            <a:ext cx="10972800" cy="830997"/>
           </a:xfrm>
           <a:prstGeom prst="rect">
             <a:avLst/>
@@ -4708,7 +4727,7 @@
           <a:p>
             <a:pPr algn="ctr"/>
             <a:r>
-              <a:rPr lang="en-US" sz="6600" dirty="0">
+              <a:rPr lang="en-US" sz="4800" dirty="0">
                 <a:latin typeface="Arial" panose="020B0604020202020204" pitchFamily="34" charset="0"/>
               </a:rPr>
               <a:t>Methodology</a:t>
@@ -4730,8 +4749,8 @@
         </p:nvSpPr>
         <p:spPr>
           <a:xfrm>
-            <a:off x="21945600" y="16280849"/>
-            <a:ext cx="10972800" cy="2123658"/>
+            <a:off x="21923829" y="19620995"/>
+            <a:ext cx="10972800" cy="830997"/>
           </a:xfrm>
           <a:prstGeom prst="rect">
             <a:avLst/>
@@ -4749,58 +4768,10 @@
           <a:p>
             <a:pPr algn="ctr"/>
             <a:r>
-              <a:rPr lang="en-US" sz="6600" dirty="0">
+              <a:rPr lang="en-US" sz="4800" dirty="0">
                 <a:latin typeface="Arial" panose="020B0604020202020204" pitchFamily="34" charset="0"/>
               </a:rPr>
-              <a:t>Acknowledgements </a:t>
-            </a:r>
-          </a:p>
-          <a:p>
-            <a:pPr algn="ctr"/>
-            <a:r>
-              <a:rPr lang="en-US" sz="6600" dirty="0">
-                <a:latin typeface="Arial" panose="020B0604020202020204" pitchFamily="34" charset="0"/>
-              </a:rPr>
-              <a:t>&amp; Bibliography</a:t>
-            </a:r>
-          </a:p>
-        </p:txBody>
-      </p:sp>
-      <p:sp>
-        <p:nvSpPr>
-          <p:cNvPr id="16" name="TextBox 15">
-            <a:extLst>
-              <a:ext uri="{FF2B5EF4-FFF2-40B4-BE49-F238E27FC236}">
-                <a16:creationId xmlns:a16="http://schemas.microsoft.com/office/drawing/2014/main" id="{71EA9BAE-3E9B-8243-B1A1-0B3ADE458454}"/>
-              </a:ext>
-            </a:extLst>
-          </p:cNvPr>
-          <p:cNvSpPr txBox="1"/>
-          <p:nvPr/>
-        </p:nvSpPr>
-        <p:spPr>
-          <a:xfrm>
-            <a:off x="21945600" y="12084560"/>
-            <a:ext cx="10972800" cy="1107996"/>
-          </a:xfrm>
-          <a:prstGeom prst="rect">
-            <a:avLst/>
-          </a:prstGeom>
-          <a:noFill/>
-          <a:ln>
-            <a:noFill/>
-          </a:ln>
-        </p:spPr>
-        <p:txBody>
-          <a:bodyPr wrap="square" rtlCol="0">
-            <a:spAutoFit/>
-          </a:bodyPr>
-          <a:lstStyle/>
-          <a:p>
-            <a:pPr algn="ctr"/>
-            <a:r>
-              <a:rPr lang="en-US" sz="6600" dirty="0"/>
-              <a:t>Future Work</a:t>
+              <a:t>Acknowledgements</a:t>
             </a:r>
           </a:p>
         </p:txBody>
@@ -4821,7 +4792,7 @@
         </p:nvCxnSpPr>
         <p:spPr>
           <a:xfrm flipH="1">
-            <a:off x="914400" y="5430381"/>
+            <a:off x="940254" y="5171278"/>
             <a:ext cx="9144000" cy="0"/>
           </a:xfrm>
           <a:prstGeom prst="line">
@@ -4864,7 +4835,7 @@
         </p:nvCxnSpPr>
         <p:spPr>
           <a:xfrm flipH="1">
-            <a:off x="786493" y="11218971"/>
+            <a:off x="825739" y="9497946"/>
             <a:ext cx="9144000" cy="0"/>
           </a:xfrm>
           <a:prstGeom prst="line">
@@ -4907,7 +4878,7 @@
         </p:nvCxnSpPr>
         <p:spPr>
           <a:xfrm flipH="1">
-            <a:off x="11887200" y="5430381"/>
+            <a:off x="11887200" y="5171278"/>
             <a:ext cx="9144000" cy="0"/>
           </a:xfrm>
           <a:prstGeom prst="line">
@@ -4950,50 +4921,7 @@
         </p:nvCxnSpPr>
         <p:spPr>
           <a:xfrm flipH="1">
-            <a:off x="22860000" y="5430381"/>
-            <a:ext cx="9144000" cy="0"/>
-          </a:xfrm>
-          <a:prstGeom prst="line">
-            <a:avLst/>
-          </a:prstGeom>
-          <a:ln w="50800">
-            <a:solidFill>
-              <a:srgbClr val="BC2B3A"/>
-            </a:solidFill>
-          </a:ln>
-        </p:spPr>
-        <p:style>
-          <a:lnRef idx="1">
-            <a:schemeClr val="accent1"/>
-          </a:lnRef>
-          <a:fillRef idx="0">
-            <a:schemeClr val="accent1"/>
-          </a:fillRef>
-          <a:effectRef idx="0">
-            <a:schemeClr val="accent1"/>
-          </a:effectRef>
-          <a:fontRef idx="minor">
-            <a:schemeClr val="tx1"/>
-          </a:fontRef>
-        </p:style>
-      </p:cxnSp>
-      <p:cxnSp>
-        <p:nvCxnSpPr>
-          <p:cNvPr id="26" name="Straight Connector 25">
-            <a:extLst>
-              <a:ext uri="{FF2B5EF4-FFF2-40B4-BE49-F238E27FC236}">
-                <a16:creationId xmlns:a16="http://schemas.microsoft.com/office/drawing/2014/main" id="{1A9075C6-7E76-F145-B869-491AA5336D84}"/>
-              </a:ext>
-            </a:extLst>
-          </p:cNvPr>
-          <p:cNvCxnSpPr>
-            <a:cxnSpLocks/>
-          </p:cNvCxnSpPr>
-          <p:nvPr/>
-        </p:nvCxnSpPr>
-        <p:spPr>
-          <a:xfrm flipH="1">
-            <a:off x="22955250" y="13201851"/>
+            <a:off x="22885854" y="16087042"/>
             <a:ext cx="9144000" cy="0"/>
           </a:xfrm>
           <a:prstGeom prst="line">
@@ -5036,7 +4964,7 @@
         </p:nvCxnSpPr>
         <p:spPr>
           <a:xfrm flipH="1">
-            <a:off x="22955250" y="18404507"/>
+            <a:off x="22933479" y="20592891"/>
             <a:ext cx="9144000" cy="0"/>
           </a:xfrm>
           <a:prstGeom prst="line">
@@ -5077,8 +5005,8 @@
         </p:nvSpPr>
         <p:spPr>
           <a:xfrm>
-            <a:off x="22860000" y="18516992"/>
-            <a:ext cx="9239250" cy="3539430"/>
+            <a:off x="22838229" y="20705376"/>
+            <a:ext cx="9239250" cy="892552"/>
           </a:xfrm>
           <a:prstGeom prst="rect">
             <a:avLst/>
@@ -5092,120 +5020,34 @@
           <a:lstStyle/>
           <a:p>
             <a:r>
-              <a:rPr lang="en-US" sz="3600" dirty="0">
+              <a:rPr lang="en-US" sz="2600" dirty="0">
                 <a:latin typeface="Arial" panose="020B0604020202020204" pitchFamily="34" charset="0"/>
               </a:rPr>
               <a:t>We would like to thank our mentors Anirudh Allam, Thomas </a:t>
             </a:r>
             <a:r>
-              <a:rPr lang="en-US" sz="3600" dirty="0" err="1">
+              <a:rPr lang="en-US" sz="2600" dirty="0" err="1">
                 <a:latin typeface="Arial" panose="020B0604020202020204" pitchFamily="34" charset="0"/>
               </a:rPr>
               <a:t>Navidi</a:t>
             </a:r>
             <a:r>
-              <a:rPr lang="en-US" sz="3600" dirty="0">
+              <a:rPr lang="en-US" sz="2600" dirty="0">
                 <a:latin typeface="Arial" panose="020B0604020202020204" pitchFamily="34" charset="0"/>
               </a:rPr>
               <a:t>, Simona </a:t>
             </a:r>
             <a:r>
-              <a:rPr lang="en-US" sz="3600" dirty="0" err="1">
+              <a:rPr lang="en-US" sz="2600" dirty="0" err="1">
                 <a:latin typeface="Arial" panose="020B0604020202020204" pitchFamily="34" charset="0"/>
               </a:rPr>
               <a:t>Onori</a:t>
             </a:r>
             <a:r>
-              <a:rPr lang="en-US" sz="3600" dirty="0">
+              <a:rPr lang="en-US" sz="2600" dirty="0">
                 <a:latin typeface="Arial" panose="020B0604020202020204" pitchFamily="34" charset="0"/>
               </a:rPr>
               <a:t>, Ram Rajagopal, and Abbas El Gamal.</a:t>
-            </a:r>
-          </a:p>
-          <a:p>
-            <a:endParaRPr lang="en-US" sz="1200" dirty="0">
-              <a:latin typeface="Arial" panose="020B0604020202020204" pitchFamily="34" charset="0"/>
-            </a:endParaRPr>
-          </a:p>
-          <a:p>
-            <a:r>
-              <a:rPr lang="en-US" sz="2400" dirty="0">
-                <a:latin typeface="Arial" panose="020B0604020202020204" pitchFamily="34" charset="0"/>
-              </a:rPr>
-              <a:t>1. </a:t>
-            </a:r>
-            <a:r>
-              <a:rPr lang="en-US" sz="2400" dirty="0" err="1">
-                <a:latin typeface="Arial" panose="020B0604020202020204" pitchFamily="34" charset="0"/>
-              </a:rPr>
-              <a:t>Taborelli</a:t>
-            </a:r>
-            <a:r>
-              <a:rPr lang="en-US" sz="2400" dirty="0">
-                <a:latin typeface="Arial" panose="020B0604020202020204" pitchFamily="34" charset="0"/>
-              </a:rPr>
-              <a:t>, Carlo, and Simona </a:t>
-            </a:r>
-            <a:r>
-              <a:rPr lang="en-US" sz="2400" dirty="0" err="1">
-                <a:latin typeface="Arial" panose="020B0604020202020204" pitchFamily="34" charset="0"/>
-              </a:rPr>
-              <a:t>Onori</a:t>
-            </a:r>
-            <a:r>
-              <a:rPr lang="en-US" sz="2400" dirty="0">
-                <a:latin typeface="Arial" panose="020B0604020202020204" pitchFamily="34" charset="0"/>
-              </a:rPr>
-              <a:t>. "State of charge estimation using extended Kalman filters for battery management system." </a:t>
-            </a:r>
-            <a:r>
-              <a:rPr lang="en-US" sz="2400" i="1" dirty="0">
-                <a:latin typeface="Arial" panose="020B0604020202020204" pitchFamily="34" charset="0"/>
-              </a:rPr>
-              <a:t>2014 IEEE International Electric Vehicle Conference (IEVC)</a:t>
-            </a:r>
-            <a:r>
-              <a:rPr lang="en-US" sz="2400" dirty="0">
-                <a:latin typeface="Arial" panose="020B0604020202020204" pitchFamily="34" charset="0"/>
-              </a:rPr>
-              <a:t>. IEEE, 2014.</a:t>
-            </a:r>
-          </a:p>
-        </p:txBody>
-      </p:sp>
-      <p:sp>
-        <p:nvSpPr>
-          <p:cNvPr id="31" name="TextBox 30">
-            <a:extLst>
-              <a:ext uri="{FF2B5EF4-FFF2-40B4-BE49-F238E27FC236}">
-                <a16:creationId xmlns:a16="http://schemas.microsoft.com/office/drawing/2014/main" id="{CBCF04CB-86D8-F843-9BF2-84F1B7CB9A86}"/>
-              </a:ext>
-            </a:extLst>
-          </p:cNvPr>
-          <p:cNvSpPr txBox="1"/>
-          <p:nvPr/>
-        </p:nvSpPr>
-        <p:spPr>
-          <a:xfrm>
-            <a:off x="22812375" y="13310189"/>
-            <a:ext cx="9239250" cy="2862322"/>
-          </a:xfrm>
-          <a:prstGeom prst="rect">
-            <a:avLst/>
-          </a:prstGeom>
-          <a:noFill/>
-        </p:spPr>
-        <p:txBody>
-          <a:bodyPr wrap="square" rtlCol="0">
-            <a:spAutoFit/>
-          </a:bodyPr>
-          <a:lstStyle/>
-          <a:p>
-            <a:r>
-              <a:rPr lang="en-US" sz="3600" dirty="0">
-                <a:latin typeface="Arial" panose="020B0604020202020204" pitchFamily="34" charset="0"/>
-              </a:rPr>
-              <a:t>This work has shown promise in ML models, but two important next steps are determining the architecture best suited to the task and the approach’s generalizability to more use cases.</a:t>
             </a:r>
           </a:p>
         </p:txBody>
@@ -5224,8 +5066,8 @@
         </p:nvSpPr>
         <p:spPr>
           <a:xfrm>
-            <a:off x="22907625" y="5548014"/>
-            <a:ext cx="9239250" cy="1754326"/>
+            <a:off x="22933479" y="16204675"/>
+            <a:ext cx="9239250" cy="3416320"/>
           </a:xfrm>
           <a:prstGeom prst="rect">
             <a:avLst/>
@@ -5246,11 +5088,20 @@
               <a:rPr lang="en-US" sz="3600" dirty="0">
                 <a:latin typeface="Arial" panose="020B0604020202020204" pitchFamily="34" charset="0"/>
               </a:rPr>
-              <a:t>ML models work, demonstrating lower cost (squared error) on every run in the validation set versus the circuit model</a:t>
-            </a:r>
-            <a:endParaRPr lang="en-US" sz="1600" dirty="0">
-              <a:latin typeface="Arial" panose="020B0604020202020204" pitchFamily="34" charset="0"/>
-            </a:endParaRPr>
+              <a:t>ML models work, demonstrating lower squared error on every run in the validation set versus the circuit model</a:t>
+            </a:r>
+          </a:p>
+          <a:p>
+            <a:pPr marL="571500" indent="-571500">
+              <a:buFont typeface="Arial" panose="020B0604020202020204" pitchFamily="34" charset="0"/>
+              <a:buChar char="•"/>
+            </a:pPr>
+            <a:r>
+              <a:rPr lang="en-US" sz="3600" dirty="0">
+                <a:latin typeface="Arial" panose="020B0604020202020204" pitchFamily="34" charset="0"/>
+              </a:rPr>
+              <a:t>Key takeaway: ML models perform well, outperforming the circuit model in modeling complex drive cycle behavior</a:t>
+            </a:r>
           </a:p>
         </p:txBody>
       </p:sp>
@@ -5268,8 +5119,8 @@
         </p:nvSpPr>
         <p:spPr>
           <a:xfrm>
-            <a:off x="11839575" y="5548014"/>
-            <a:ext cx="9239250" cy="3970318"/>
+            <a:off x="11839575" y="5288911"/>
+            <a:ext cx="9239250" cy="3416320"/>
           </a:xfrm>
           <a:prstGeom prst="rect">
             <a:avLst/>
@@ -5282,15 +5133,29 @@
           </a:bodyPr>
           <a:lstStyle/>
           <a:p>
+            <a:r>
+              <a:rPr lang="en-US" sz="3600" dirty="0">
+                <a:latin typeface="Arial" panose="020B0604020202020204" pitchFamily="34" charset="0"/>
+              </a:rPr>
+              <a:t>Data was acquired from six NCR18650B cells at these temperatures and cycles</a:t>
+            </a:r>
+          </a:p>
+          <a:p>
             <a:pPr marL="571500" indent="-571500">
               <a:buFont typeface="Arial" panose="020B0604020202020204" pitchFamily="34" charset="0"/>
               <a:buChar char="•"/>
             </a:pPr>
             <a:r>
+              <a:rPr lang="en-US" sz="3600" i="1" dirty="0">
+                <a:latin typeface="Arial" panose="020B0604020202020204" pitchFamily="34" charset="0"/>
+              </a:rPr>
+              <a:t>Temperature:</a:t>
+            </a:r>
+            <a:r>
               <a:rPr lang="en-US" sz="3600" dirty="0">
                 <a:latin typeface="Arial" panose="020B0604020202020204" pitchFamily="34" charset="0"/>
               </a:rPr>
-              <a:t>Our data was discharge cycles of six NCR18650B cells at three temperatures for five constant discharge cycles and three real world drive cycles </a:t>
+              <a:t> 5°C, 25°C, 35°C</a:t>
             </a:r>
           </a:p>
           <a:p>
@@ -5299,10 +5164,36 @@
               <a:buChar char="•"/>
             </a:pPr>
             <a:r>
+              <a:rPr lang="en-US" sz="3600" i="1" dirty="0">
+                <a:latin typeface="Arial" panose="020B0604020202020204" pitchFamily="34" charset="0"/>
+              </a:rPr>
+              <a:t>Cycle: </a:t>
+            </a:r>
+            <a:r>
               <a:rPr lang="en-US" sz="3600" dirty="0">
                 <a:latin typeface="Arial" panose="020B0604020202020204" pitchFamily="34" charset="0"/>
               </a:rPr>
-              <a:t>Key takeaway: ML models perform well, outperforming the circuit model in modeling complex drive cycle behavior</a:t>
+              <a:t>Const. </a:t>
+            </a:r>
+            <a:r>
+              <a:rPr lang="en-US" sz="3600" dirty="0" err="1">
+                <a:latin typeface="Arial" panose="020B0604020202020204" pitchFamily="34" charset="0"/>
+              </a:rPr>
+              <a:t>Curr</a:t>
+            </a:r>
+            <a:r>
+              <a:rPr lang="en-US" sz="3600" dirty="0">
+                <a:latin typeface="Arial" panose="020B0604020202020204" pitchFamily="34" charset="0"/>
+              </a:rPr>
+              <a:t>., HPPC, US06, UDDS</a:t>
+            </a:r>
+          </a:p>
+          <a:p>
+            <a:r>
+              <a:rPr lang="en-US" sz="3600" dirty="0">
+                <a:latin typeface="Arial" panose="020B0604020202020204" pitchFamily="34" charset="0"/>
+              </a:rPr>
+              <a:t>For validation, one of each drive cycle was held out at different temperatures</a:t>
             </a:r>
           </a:p>
         </p:txBody>
@@ -5321,8 +5212,8 @@
         </p:nvSpPr>
         <p:spPr>
           <a:xfrm>
-            <a:off x="888546" y="5548014"/>
-            <a:ext cx="9239250" cy="4524315"/>
+            <a:off x="914400" y="5288911"/>
+            <a:ext cx="9239250" cy="2862322"/>
           </a:xfrm>
           <a:prstGeom prst="rect">
             <a:avLst/>
@@ -5344,18 +5235,6 @@
                 <a:latin typeface="Arial" panose="020B0604020202020204" pitchFamily="34" charset="0"/>
               </a:rPr>
               <a:t>Our project aims to address whether ML can be used to model battery voltage</a:t>
-            </a:r>
-          </a:p>
-          <a:p>
-            <a:pPr marL="571500" indent="-571500">
-              <a:buFont typeface="Arial" panose="020B0604020202020204" pitchFamily="34" charset="0"/>
-              <a:buChar char="•"/>
-            </a:pPr>
-            <a:r>
-              <a:rPr lang="en-US" sz="3600" dirty="0">
-                <a:latin typeface="Arial" panose="020B0604020202020204" pitchFamily="34" charset="0"/>
-              </a:rPr>
-              <a:t>Physics models are state of the art, but computational limits cause traditional circuit model to be used in practice</a:t>
             </a:r>
           </a:p>
           <a:p>
@@ -5386,8 +5265,8 @@
         </p:nvSpPr>
         <p:spPr>
           <a:xfrm>
-            <a:off x="738868" y="11327309"/>
-            <a:ext cx="9239250" cy="10618291"/>
+            <a:off x="778114" y="9606284"/>
+            <a:ext cx="9239250" cy="17266265"/>
           </a:xfrm>
           <a:prstGeom prst="rect">
             <a:avLst/>
@@ -5400,10 +5279,6 @@
           </a:bodyPr>
           <a:lstStyle/>
           <a:p>
-            <a:pPr marL="571500" indent="-571500">
-              <a:buFont typeface="Arial" panose="020B0604020202020204" pitchFamily="34" charset="0"/>
-              <a:buChar char="•"/>
-            </a:pPr>
             <a:r>
               <a:rPr lang="en-US" sz="3600" dirty="0">
                 <a:latin typeface="Arial" panose="020B0604020202020204" pitchFamily="34" charset="0"/>
@@ -5484,6 +5359,80 @@
             </a:endParaRPr>
           </a:p>
           <a:p>
+            <a:r>
+              <a:rPr lang="en-US" sz="3600" dirty="0">
+                <a:latin typeface="Arial" panose="020B0604020202020204" pitchFamily="34" charset="0"/>
+              </a:rPr>
+              <a:t>Three ML models were used</a:t>
+            </a:r>
+          </a:p>
+          <a:p>
+            <a:pPr marL="571500" indent="-571500">
+              <a:buFont typeface="Arial" panose="020B0604020202020204" pitchFamily="34" charset="0"/>
+              <a:buChar char="•"/>
+            </a:pPr>
+            <a:r>
+              <a:rPr lang="en-US" sz="3600" dirty="0" err="1">
+                <a:latin typeface="Arial" panose="020B0604020202020204" pitchFamily="34" charset="0"/>
+              </a:rPr>
+              <a:t>nn_relu</a:t>
+            </a:r>
+            <a:r>
+              <a:rPr lang="en-US" sz="3600" dirty="0">
+                <a:latin typeface="Arial" panose="020B0604020202020204" pitchFamily="34" charset="0"/>
+              </a:rPr>
+              <a:t> a 3 layer NN with [8, 4, 2] neurons per layer and </a:t>
+            </a:r>
+            <a:r>
+              <a:rPr lang="en-US" sz="3600" dirty="0" err="1">
+                <a:latin typeface="Arial" panose="020B0604020202020204" pitchFamily="34" charset="0"/>
+              </a:rPr>
+              <a:t>relu</a:t>
+            </a:r>
+            <a:r>
+              <a:rPr lang="en-US" sz="3600" dirty="0">
+                <a:latin typeface="Arial" panose="020B0604020202020204" pitchFamily="34" charset="0"/>
+              </a:rPr>
+              <a:t> activations</a:t>
+            </a:r>
+          </a:p>
+          <a:p>
+            <a:pPr marL="571500" indent="-571500">
+              <a:buFont typeface="Arial" panose="020B0604020202020204" pitchFamily="34" charset="0"/>
+              <a:buChar char="•"/>
+            </a:pPr>
+            <a:r>
+              <a:rPr lang="en-US" sz="3600" dirty="0" err="1">
+                <a:latin typeface="Arial" panose="020B0604020202020204" pitchFamily="34" charset="0"/>
+              </a:rPr>
+              <a:t>nn_tanh</a:t>
+            </a:r>
+            <a:r>
+              <a:rPr lang="en-US" sz="3600" dirty="0">
+                <a:latin typeface="Arial" panose="020B0604020202020204" pitchFamily="34" charset="0"/>
+              </a:rPr>
+              <a:t> a 3 layer NN with [8, 4, 2] neurons per layer and tanh activations</a:t>
+            </a:r>
+          </a:p>
+          <a:p>
+            <a:pPr marL="571500" indent="-571500">
+              <a:buFont typeface="Arial" panose="020B0604020202020204" pitchFamily="34" charset="0"/>
+              <a:buChar char="•"/>
+            </a:pPr>
+            <a:r>
+              <a:rPr lang="en-US" sz="3600" dirty="0" err="1">
+                <a:latin typeface="Arial" panose="020B0604020202020204" pitchFamily="34" charset="0"/>
+              </a:rPr>
+              <a:t>lstm</a:t>
+            </a:r>
+            <a:r>
+              <a:rPr lang="en-US" sz="3600" dirty="0">
+                <a:latin typeface="Arial" panose="020B0604020202020204" pitchFamily="34" charset="0"/>
+              </a:rPr>
+              <a:t> 2 layer N with 20 recurrent neurons with tanh activations and sigmoid connections followed by 1 neuron with linear activations</a:t>
+            </a:r>
+          </a:p>
+          <a:p>
             <a:pPr marL="571500" indent="-571500">
               <a:buFont typeface="Arial" panose="020B0604020202020204" pitchFamily="34" charset="0"/>
               <a:buChar char="•"/>
@@ -5511,26 +5460,63 @@
             </a:endParaRPr>
           </a:p>
           <a:p>
-            <a:endParaRPr lang="en-US" sz="3600" dirty="0">
-              <a:latin typeface="Arial" panose="020B0604020202020204" pitchFamily="34" charset="0"/>
-            </a:endParaRPr>
-          </a:p>
-          <a:p>
-            <a:endParaRPr lang="en-US" sz="3600" dirty="0">
-              <a:latin typeface="Arial" panose="020B0604020202020204" pitchFamily="34" charset="0"/>
-            </a:endParaRPr>
-          </a:p>
-          <a:p>
             <a:pPr marL="571500" indent="-571500">
               <a:buFont typeface="Arial" panose="020B0604020202020204" pitchFamily="34" charset="0"/>
               <a:buChar char="•"/>
             </a:pPr>
-            <a:r>
-              <a:rPr lang="en-US" sz="3600" dirty="0">
-                <a:latin typeface="Arial" panose="020B0604020202020204" pitchFamily="34" charset="0"/>
-              </a:rPr>
-              <a:t>ML models make different assumptions about the form of V = f(I, SoC) than the circuit model, and learn f from data</a:t>
-            </a:r>
+            <a:endParaRPr lang="en-US" sz="3600" dirty="0">
+              <a:latin typeface="Arial" panose="020B0604020202020204" pitchFamily="34" charset="0"/>
+            </a:endParaRPr>
+          </a:p>
+          <a:p>
+            <a:pPr marL="571500" indent="-571500">
+              <a:buFont typeface="Arial" panose="020B0604020202020204" pitchFamily="34" charset="0"/>
+              <a:buChar char="•"/>
+            </a:pPr>
+            <a:endParaRPr lang="en-US" sz="3600" dirty="0">
+              <a:latin typeface="Arial" panose="020B0604020202020204" pitchFamily="34" charset="0"/>
+            </a:endParaRPr>
+          </a:p>
+          <a:p>
+            <a:pPr marL="571500" indent="-571500">
+              <a:buFont typeface="Arial" panose="020B0604020202020204" pitchFamily="34" charset="0"/>
+              <a:buChar char="•"/>
+            </a:pPr>
+            <a:endParaRPr lang="en-US" sz="3600" dirty="0">
+              <a:latin typeface="Arial" panose="020B0604020202020204" pitchFamily="34" charset="0"/>
+            </a:endParaRPr>
+          </a:p>
+          <a:p>
+            <a:pPr marL="571500" indent="-571500">
+              <a:buFont typeface="Arial" panose="020B0604020202020204" pitchFamily="34" charset="0"/>
+              <a:buChar char="•"/>
+            </a:pPr>
+            <a:endParaRPr lang="en-US" sz="3600" dirty="0">
+              <a:latin typeface="Arial" panose="020B0604020202020204" pitchFamily="34" charset="0"/>
+            </a:endParaRPr>
+          </a:p>
+          <a:p>
+            <a:pPr marL="571500" indent="-571500">
+              <a:buFont typeface="Arial" panose="020B0604020202020204" pitchFamily="34" charset="0"/>
+              <a:buChar char="•"/>
+            </a:pPr>
+            <a:endParaRPr lang="en-US" sz="3600" dirty="0">
+              <a:latin typeface="Arial" panose="020B0604020202020204" pitchFamily="34" charset="0"/>
+            </a:endParaRPr>
+          </a:p>
+          <a:p>
+            <a:pPr marL="571500" indent="-571500">
+              <a:buFont typeface="Arial" panose="020B0604020202020204" pitchFamily="34" charset="0"/>
+              <a:buChar char="•"/>
+            </a:pPr>
+            <a:endParaRPr lang="en-US" sz="3600" dirty="0">
+              <a:latin typeface="Arial" panose="020B0604020202020204" pitchFamily="34" charset="0"/>
+            </a:endParaRPr>
+          </a:p>
+          <a:p>
+            <a:endParaRPr lang="en-US" sz="3600" dirty="0">
+              <a:latin typeface="Arial" panose="020B0604020202020204" pitchFamily="34" charset="0"/>
+            </a:endParaRPr>
           </a:p>
         </p:txBody>
       </p:sp>
@@ -5548,7 +5534,7 @@
         </p:nvGrpSpPr>
         <p:grpSpPr>
           <a:xfrm>
-            <a:off x="2309607" y="17681670"/>
+            <a:off x="2348853" y="13574314"/>
             <a:ext cx="6097772" cy="1961987"/>
             <a:chOff x="2590800" y="14956303"/>
             <a:chExt cx="5834742" cy="2453816"/>
@@ -5869,7 +5855,7 @@
         </p:nvGrpSpPr>
         <p:grpSpPr>
           <a:xfrm>
-            <a:off x="2266064" y="13086576"/>
+            <a:off x="2305310" y="11365551"/>
             <a:ext cx="6097772" cy="1961987"/>
             <a:chOff x="2309607" y="14553232"/>
             <a:chExt cx="6097772" cy="1961987"/>
@@ -6230,42 +6216,131 @@
           </p:spPr>
         </p:pic>
       </p:grpSp>
-      <p:pic>
-        <p:nvPicPr>
-          <p:cNvPr id="63" name="Picture 62">
+      <p:sp>
+        <p:nvSpPr>
+          <p:cNvPr id="74" name="TextBox 73">
             <a:extLst>
               <a:ext uri="{FF2B5EF4-FFF2-40B4-BE49-F238E27FC236}">
-                <a16:creationId xmlns:a16="http://schemas.microsoft.com/office/drawing/2014/main" id="{6B40BBFD-0BA5-204D-B8D8-02C750A6865B}"/>
+                <a16:creationId xmlns:a16="http://schemas.microsoft.com/office/drawing/2014/main" id="{E3EF843E-53A4-1B4F-9470-F4AB04F22461}"/>
               </a:ext>
             </a:extLst>
           </p:cNvPr>
-          <p:cNvPicPr>
-            <a:picLocks noChangeAspect="1"/>
-          </p:cNvPicPr>
+          <p:cNvSpPr txBox="1"/>
           <p:nvPr/>
-        </p:nvPicPr>
-        <p:blipFill>
-          <a:blip r:embed="rId8">
-            <a:extLst>
-              <a:ext uri="{28A0092B-C50C-407E-A947-70E740481C1C}">
-                <a14:useLocalDpi xmlns:a14="http://schemas.microsoft.com/office/drawing/2010/main" val="0"/>
-              </a:ext>
-            </a:extLst>
-          </a:blip>
-          <a:stretch>
-            <a:fillRect/>
-          </a:stretch>
-        </p:blipFill>
+        </p:nvSpPr>
         <p:spPr>
           <a:xfrm>
-            <a:off x="1411115" y="15191181"/>
-            <a:ext cx="8519378" cy="2377501"/>
+            <a:off x="10972800" y="8713804"/>
+            <a:ext cx="10972800" cy="830997"/>
           </a:xfrm>
           <a:prstGeom prst="rect">
             <a:avLst/>
           </a:prstGeom>
+          <a:noFill/>
+          <a:ln>
+            <a:noFill/>
+          </a:ln>
         </p:spPr>
-      </p:pic>
+        <p:txBody>
+          <a:bodyPr wrap="square" rtlCol="0">
+            <a:spAutoFit/>
+          </a:bodyPr>
+          <a:lstStyle/>
+          <a:p>
+            <a:pPr algn="ctr"/>
+            <a:r>
+              <a:rPr lang="en-US" sz="4800" dirty="0">
+                <a:latin typeface="Arial" panose="020B0604020202020204" pitchFamily="34" charset="0"/>
+              </a:rPr>
+              <a:t>Results</a:t>
+            </a:r>
+          </a:p>
+        </p:txBody>
+      </p:sp>
+      <p:cxnSp>
+        <p:nvCxnSpPr>
+          <p:cNvPr id="75" name="Straight Connector 74">
+            <a:extLst>
+              <a:ext uri="{FF2B5EF4-FFF2-40B4-BE49-F238E27FC236}">
+                <a16:creationId xmlns:a16="http://schemas.microsoft.com/office/drawing/2014/main" id="{B6689E22-46A6-8943-93CA-F3008DBAD509}"/>
+              </a:ext>
+            </a:extLst>
+          </p:cNvPr>
+          <p:cNvCxnSpPr>
+            <a:cxnSpLocks/>
+          </p:cNvCxnSpPr>
+          <p:nvPr/>
+        </p:nvCxnSpPr>
+        <p:spPr>
+          <a:xfrm flipH="1">
+            <a:off x="11887198" y="9562697"/>
+            <a:ext cx="9144000" cy="0"/>
+          </a:xfrm>
+          <a:prstGeom prst="line">
+            <a:avLst/>
+          </a:prstGeom>
+          <a:ln w="50800">
+            <a:solidFill>
+              <a:srgbClr val="BC2B3A"/>
+            </a:solidFill>
+          </a:ln>
+        </p:spPr>
+        <p:style>
+          <a:lnRef idx="1">
+            <a:schemeClr val="accent1"/>
+          </a:lnRef>
+          <a:fillRef idx="0">
+            <a:schemeClr val="accent1"/>
+          </a:fillRef>
+          <a:effectRef idx="0">
+            <a:schemeClr val="accent1"/>
+          </a:effectRef>
+          <a:fontRef idx="minor">
+            <a:schemeClr val="tx1"/>
+          </a:fontRef>
+        </p:style>
+      </p:cxnSp>
+      <p:sp>
+        <p:nvSpPr>
+          <p:cNvPr id="76" name="TextBox 75">
+            <a:extLst>
+              <a:ext uri="{FF2B5EF4-FFF2-40B4-BE49-F238E27FC236}">
+                <a16:creationId xmlns:a16="http://schemas.microsoft.com/office/drawing/2014/main" id="{412F88E6-1FD8-BF46-9AA5-F047E1474410}"/>
+              </a:ext>
+            </a:extLst>
+          </p:cNvPr>
+          <p:cNvSpPr txBox="1"/>
+          <p:nvPr/>
+        </p:nvSpPr>
+        <p:spPr>
+          <a:xfrm>
+            <a:off x="11839573" y="9680330"/>
+            <a:ext cx="9239250" cy="646331"/>
+          </a:xfrm>
+          <a:prstGeom prst="rect">
+            <a:avLst/>
+          </a:prstGeom>
+          <a:noFill/>
+        </p:spPr>
+        <p:txBody>
+          <a:bodyPr wrap="square" rtlCol="0">
+            <a:spAutoFit/>
+          </a:bodyPr>
+          <a:lstStyle/>
+          <a:p>
+            <a:pPr marL="571500" indent="-571500">
+              <a:buFont typeface="Arial" panose="020B0604020202020204" pitchFamily="34" charset="0"/>
+              <a:buChar char="•"/>
+            </a:pPr>
+            <a:r>
+              <a:rPr lang="en-US" sz="3600" dirty="0">
+                <a:latin typeface="Arial" panose="020B0604020202020204" pitchFamily="34" charset="0"/>
+              </a:rPr>
+              <a:t>Blah</a:t>
+            </a:r>
+          </a:p>
+        </p:txBody>
+      </p:sp>
     </p:spTree>
   </p:cSld>
   <p:clrMapOvr>

</xml_diff>

<commit_message>
Updated poster w/o plots
</commit_message>
<xml_diff>
--- a/poster/poster.pptx
+++ b/poster/poster.pptx
@@ -238,7 +238,7 @@
           <a:p>
             <a:fld id="{45DBEBB1-4C23-6745-9D21-86F7D825788B}" type="datetimeFigureOut">
               <a:rPr lang="en-US" smtClean="0"/>
-              <a:t>12/3/19</a:t>
+              <a:t>12/4/19</a:t>
             </a:fld>
             <a:endParaRPr lang="en-US"/>
           </a:p>
@@ -549,26 +549,7 @@
           <a:bodyPr/>
           <a:lstStyle/>
           <a:p>
-            <a:r>
-              <a:rPr lang="en-US" dirty="0"/>
-              <a:t>Looking at HPPC … plots voltage </a:t>
-            </a:r>
-            <a:r>
-              <a:rPr lang="en-US" dirty="0" err="1"/>
-              <a:t>pred</a:t>
-            </a:r>
-            <a:r>
-              <a:rPr lang="en-US" dirty="0"/>
-              <a:t> vs time, squared error in </a:t>
-            </a:r>
-            <a:r>
-              <a:rPr lang="en-US" dirty="0" err="1"/>
-              <a:t>pred</a:t>
-            </a:r>
-            <a:r>
-              <a:rPr lang="en-US" dirty="0"/>
-              <a:t> vs time, zoomed plot</a:t>
-            </a:r>
+            <a:endParaRPr lang="en-US" dirty="0"/>
           </a:p>
         </p:txBody>
       </p:sp>
@@ -803,7 +784,7 @@
               <a:pPr>
                 <a:defRPr/>
               </a:pPr>
-              <a:t>12/3/19</a:t>
+              <a:t>12/4/19</a:t>
             </a:fld>
             <a:endParaRPr lang="en-US"/>
           </a:p>
@@ -1011,7 +992,7 @@
               <a:pPr>
                 <a:defRPr/>
               </a:pPr>
-              <a:t>12/3/19</a:t>
+              <a:t>12/4/19</a:t>
             </a:fld>
             <a:endParaRPr lang="en-US"/>
           </a:p>
@@ -1229,7 +1210,7 @@
               <a:pPr>
                 <a:defRPr/>
               </a:pPr>
-              <a:t>12/3/19</a:t>
+              <a:t>12/4/19</a:t>
             </a:fld>
             <a:endParaRPr lang="en-US"/>
           </a:p>
@@ -1437,7 +1418,7 @@
               <a:pPr>
                 <a:defRPr/>
               </a:pPr>
-              <a:t>12/3/19</a:t>
+              <a:t>12/4/19</a:t>
             </a:fld>
             <a:endParaRPr lang="en-US"/>
           </a:p>
@@ -1722,7 +1703,7 @@
               <a:pPr>
                 <a:defRPr/>
               </a:pPr>
-              <a:t>12/3/19</a:t>
+              <a:t>12/4/19</a:t>
             </a:fld>
             <a:endParaRPr lang="en-US"/>
           </a:p>
@@ -2047,7 +2028,7 @@
               <a:pPr>
                 <a:defRPr/>
               </a:pPr>
-              <a:t>12/3/19</a:t>
+              <a:t>12/4/19</a:t>
             </a:fld>
             <a:endParaRPr lang="en-US"/>
           </a:p>
@@ -2511,7 +2492,7 @@
               <a:pPr>
                 <a:defRPr/>
               </a:pPr>
-              <a:t>12/3/19</a:t>
+              <a:t>12/4/19</a:t>
             </a:fld>
             <a:endParaRPr lang="en-US"/>
           </a:p>
@@ -2668,7 +2649,7 @@
               <a:pPr>
                 <a:defRPr/>
               </a:pPr>
-              <a:t>12/3/19</a:t>
+              <a:t>12/4/19</a:t>
             </a:fld>
             <a:endParaRPr lang="en-US"/>
           </a:p>
@@ -2803,7 +2784,7 @@
               <a:pPr>
                 <a:defRPr/>
               </a:pPr>
-              <a:t>12/3/19</a:t>
+              <a:t>12/4/19</a:t>
             </a:fld>
             <a:endParaRPr lang="en-US"/>
           </a:p>
@@ -3118,7 +3099,7 @@
               <a:pPr>
                 <a:defRPr/>
               </a:pPr>
-              <a:t>12/3/19</a:t>
+              <a:t>12/4/19</a:t>
             </a:fld>
             <a:endParaRPr lang="en-US"/>
           </a:p>
@@ -3413,7 +3394,7 @@
               <a:pPr>
                 <a:defRPr/>
               </a:pPr>
-              <a:t>12/3/19</a:t>
+              <a:t>12/4/19</a:t>
             </a:fld>
             <a:endParaRPr lang="en-US"/>
           </a:p>
@@ -3734,7 +3715,7 @@
               <a:pPr>
                 <a:defRPr/>
               </a:pPr>
-              <a:t>12/3/19</a:t>
+              <a:t>12/4/19</a:t>
             </a:fld>
             <a:endParaRPr lang="en-US"/>
           </a:p>
@@ -4259,114 +4240,6 @@
           <a:chExt cx="0" cy="0"/>
         </a:xfrm>
       </p:grpSpPr>
-      <p:pic>
-        <p:nvPicPr>
-          <p:cNvPr id="71" name="Picture 70">
-            <a:extLst>
-              <a:ext uri="{FF2B5EF4-FFF2-40B4-BE49-F238E27FC236}">
-                <a16:creationId xmlns:a16="http://schemas.microsoft.com/office/drawing/2014/main" id="{F1527A6F-063E-974B-8CAC-F99B6CA497A5}"/>
-              </a:ext>
-            </a:extLst>
-          </p:cNvPr>
-          <p:cNvPicPr>
-            <a:picLocks noChangeAspect="1"/>
-          </p:cNvPicPr>
-          <p:nvPr/>
-        </p:nvPicPr>
-        <p:blipFill>
-          <a:blip r:embed="rId3">
-            <a:extLst>
-              <a:ext uri="{28A0092B-C50C-407E-A947-70E740481C1C}">
-                <a14:useLocalDpi xmlns:a14="http://schemas.microsoft.com/office/drawing/2010/main" val="0"/>
-              </a:ext>
-            </a:extLst>
-          </a:blip>
-          <a:stretch>
-            <a:fillRect/>
-          </a:stretch>
-        </p:blipFill>
-        <p:spPr>
-          <a:xfrm>
-            <a:off x="12505265" y="16575109"/>
-            <a:ext cx="7907869" cy="5410647"/>
-          </a:xfrm>
-          <a:prstGeom prst="rect">
-            <a:avLst/>
-          </a:prstGeom>
-        </p:spPr>
-      </p:pic>
-      <p:pic>
-        <p:nvPicPr>
-          <p:cNvPr id="69" name="Picture 68">
-            <a:extLst>
-              <a:ext uri="{FF2B5EF4-FFF2-40B4-BE49-F238E27FC236}">
-                <a16:creationId xmlns:a16="http://schemas.microsoft.com/office/drawing/2014/main" id="{919E7550-47B4-4B45-A9BD-E51C6ACDD80C}"/>
-              </a:ext>
-            </a:extLst>
-          </p:cNvPr>
-          <p:cNvPicPr>
-            <a:picLocks noChangeAspect="1"/>
-          </p:cNvPicPr>
-          <p:nvPr/>
-        </p:nvPicPr>
-        <p:blipFill>
-          <a:blip r:embed="rId4">
-            <a:extLst>
-              <a:ext uri="{28A0092B-C50C-407E-A947-70E740481C1C}">
-                <a14:useLocalDpi xmlns:a14="http://schemas.microsoft.com/office/drawing/2010/main" val="0"/>
-              </a:ext>
-            </a:extLst>
-          </a:blip>
-          <a:stretch>
-            <a:fillRect/>
-          </a:stretch>
-        </p:blipFill>
-        <p:spPr>
-          <a:xfrm>
-            <a:off x="12505265" y="11164479"/>
-            <a:ext cx="7959868" cy="5410630"/>
-          </a:xfrm>
-          <a:prstGeom prst="rect">
-            <a:avLst/>
-          </a:prstGeom>
-        </p:spPr>
-      </p:pic>
-      <p:pic>
-        <p:nvPicPr>
-          <p:cNvPr id="67" name="Picture 66">
-            <a:extLst>
-              <a:ext uri="{FF2B5EF4-FFF2-40B4-BE49-F238E27FC236}">
-                <a16:creationId xmlns:a16="http://schemas.microsoft.com/office/drawing/2014/main" id="{A07035F9-83C7-2043-AA1C-25E2931A511F}"/>
-              </a:ext>
-            </a:extLst>
-          </p:cNvPr>
-          <p:cNvPicPr>
-            <a:picLocks noChangeAspect="1"/>
-          </p:cNvPicPr>
-          <p:nvPr/>
-        </p:nvPicPr>
-        <p:blipFill>
-          <a:blip r:embed="rId5">
-            <a:extLst>
-              <a:ext uri="{28A0092B-C50C-407E-A947-70E740481C1C}">
-                <a14:useLocalDpi xmlns:a14="http://schemas.microsoft.com/office/drawing/2010/main" val="0"/>
-              </a:ext>
-            </a:extLst>
-          </a:blip>
-          <a:stretch>
-            <a:fillRect/>
-          </a:stretch>
-        </p:blipFill>
-        <p:spPr>
-          <a:xfrm>
-            <a:off x="22225028" y="10958877"/>
-            <a:ext cx="10465652" cy="4413227"/>
-          </a:xfrm>
-          <a:prstGeom prst="rect">
-            <a:avLst/>
-          </a:prstGeom>
-        </p:spPr>
-      </p:pic>
       <p:sp>
         <p:nvSpPr>
           <p:cNvPr id="2" name="Rectangle 1">
@@ -4434,7 +4307,7 @@
           <p:nvPr/>
         </p:nvPicPr>
         <p:blipFill>
-          <a:blip r:embed="rId6">
+          <a:blip r:embed="rId3">
             <a:extLst>
               <a:ext uri="{28A0092B-C50C-407E-A947-70E740481C1C}">
                 <a14:useLocalDpi xmlns:a14="http://schemas.microsoft.com/office/drawing/2010/main" val="0"/>
@@ -4626,7 +4499,7 @@
         </p:nvSpPr>
         <p:spPr>
           <a:xfrm>
-            <a:off x="10972802" y="4322385"/>
+            <a:off x="21771" y="17442191"/>
             <a:ext cx="10972800" cy="830997"/>
           </a:xfrm>
           <a:prstGeom prst="rect">
@@ -4667,7 +4540,7 @@
         </p:nvSpPr>
         <p:spPr>
           <a:xfrm>
-            <a:off x="21971454" y="15272080"/>
+            <a:off x="21945600" y="16203101"/>
             <a:ext cx="10972800" cy="830997"/>
           </a:xfrm>
           <a:prstGeom prst="rect">
@@ -4708,7 +4581,7 @@
         </p:nvSpPr>
         <p:spPr>
           <a:xfrm>
-            <a:off x="21771" y="8584107"/>
+            <a:off x="21771" y="7943158"/>
             <a:ext cx="10972800" cy="830997"/>
           </a:xfrm>
           <a:prstGeom prst="rect">
@@ -4749,7 +4622,7 @@
         </p:nvSpPr>
         <p:spPr>
           <a:xfrm>
-            <a:off x="21923829" y="19620995"/>
+            <a:off x="21917905" y="19761894"/>
             <a:ext cx="10972800" cy="830997"/>
           </a:xfrm>
           <a:prstGeom prst="rect">
@@ -4835,7 +4708,7 @@
         </p:nvCxnSpPr>
         <p:spPr>
           <a:xfrm flipH="1">
-            <a:off x="825739" y="9497946"/>
+            <a:off x="825739" y="8770296"/>
             <a:ext cx="9144000" cy="0"/>
           </a:xfrm>
           <a:prstGeom prst="line">
@@ -4878,7 +4751,7 @@
         </p:nvCxnSpPr>
         <p:spPr>
           <a:xfrm flipH="1">
-            <a:off x="11887200" y="5171278"/>
+            <a:off x="936169" y="18291084"/>
             <a:ext cx="9144000" cy="0"/>
           </a:xfrm>
           <a:prstGeom prst="line">
@@ -4921,7 +4794,7 @@
         </p:nvCxnSpPr>
         <p:spPr>
           <a:xfrm flipH="1">
-            <a:off x="22885854" y="16087042"/>
+            <a:off x="22860000" y="17018063"/>
             <a:ext cx="9144000" cy="0"/>
           </a:xfrm>
           <a:prstGeom prst="line">
@@ -5066,8 +4939,8 @@
         </p:nvSpPr>
         <p:spPr>
           <a:xfrm>
-            <a:off x="22933479" y="16204675"/>
-            <a:ext cx="9239250" cy="3416320"/>
+            <a:off x="22907625" y="17135696"/>
+            <a:ext cx="9239250" cy="2554545"/>
           </a:xfrm>
           <a:prstGeom prst="rect">
             <a:avLst/>
@@ -5085,10 +4958,10 @@
               <a:buChar char="•"/>
             </a:pPr>
             <a:r>
-              <a:rPr lang="en-US" sz="3600" dirty="0">
+              <a:rPr lang="en-US" sz="3200" dirty="0">
                 <a:latin typeface="Arial" panose="020B0604020202020204" pitchFamily="34" charset="0"/>
               </a:rPr>
-              <a:t>ML models work, demonstrating lower squared error on every run in the validation set versus the circuit model</a:t>
+              <a:t>ML models work, generalizing well to battery voltage prediction (measured by squared error)</a:t>
             </a:r>
           </a:p>
           <a:p>
@@ -5097,10 +4970,10 @@
               <a:buChar char="•"/>
             </a:pPr>
             <a:r>
-              <a:rPr lang="en-US" sz="3600" dirty="0">
+              <a:rPr lang="en-US" sz="3200" dirty="0">
                 <a:latin typeface="Arial" panose="020B0604020202020204" pitchFamily="34" charset="0"/>
               </a:rPr>
-              <a:t>Key takeaway: ML models perform well, outperforming the circuit model in modeling complex drive cycle behavior</a:t>
+              <a:t>ML models show promise generalizing to previously unseen drive cycles, especially incorporating additional inputs like temperature</a:t>
             </a:r>
           </a:p>
         </p:txBody>
@@ -5119,8 +4992,8 @@
         </p:nvSpPr>
         <p:spPr>
           <a:xfrm>
-            <a:off x="11839575" y="5288911"/>
-            <a:ext cx="9239250" cy="3416320"/>
+            <a:off x="888544" y="18408717"/>
+            <a:ext cx="9239250" cy="3046988"/>
           </a:xfrm>
           <a:prstGeom prst="rect">
             <a:avLst/>
@@ -5134,7 +5007,7 @@
           <a:lstStyle/>
           <a:p>
             <a:r>
-              <a:rPr lang="en-US" sz="3600" dirty="0">
+              <a:rPr lang="en-US" sz="3200" dirty="0">
                 <a:latin typeface="Arial" panose="020B0604020202020204" pitchFamily="34" charset="0"/>
               </a:rPr>
               <a:t>Data was acquired from six NCR18650B cells at these temperatures and cycles</a:t>
@@ -5146,13 +5019,13 @@
               <a:buChar char="•"/>
             </a:pPr>
             <a:r>
-              <a:rPr lang="en-US" sz="3600" i="1" dirty="0">
+              <a:rPr lang="en-US" sz="3200" i="1" dirty="0">
                 <a:latin typeface="Arial" panose="020B0604020202020204" pitchFamily="34" charset="0"/>
               </a:rPr>
               <a:t>Temperature:</a:t>
             </a:r>
             <a:r>
-              <a:rPr lang="en-US" sz="3600" dirty="0">
+              <a:rPr lang="en-US" sz="3200" dirty="0">
                 <a:latin typeface="Arial" panose="020B0604020202020204" pitchFamily="34" charset="0"/>
               </a:rPr>
               <a:t> 5°C, 25°C, 35°C</a:t>
@@ -5164,25 +5037,25 @@
               <a:buChar char="•"/>
             </a:pPr>
             <a:r>
-              <a:rPr lang="en-US" sz="3600" i="1" dirty="0">
+              <a:rPr lang="en-US" sz="3200" i="1" dirty="0">
                 <a:latin typeface="Arial" panose="020B0604020202020204" pitchFamily="34" charset="0"/>
               </a:rPr>
               <a:t>Cycle: </a:t>
             </a:r>
             <a:r>
-              <a:rPr lang="en-US" sz="3600" dirty="0">
+              <a:rPr lang="en-US" sz="3200" dirty="0">
                 <a:latin typeface="Arial" panose="020B0604020202020204" pitchFamily="34" charset="0"/>
               </a:rPr>
               <a:t>Const. </a:t>
             </a:r>
             <a:r>
-              <a:rPr lang="en-US" sz="3600" dirty="0" err="1">
+              <a:rPr lang="en-US" sz="3200" dirty="0" err="1">
                 <a:latin typeface="Arial" panose="020B0604020202020204" pitchFamily="34" charset="0"/>
               </a:rPr>
               <a:t>Curr</a:t>
             </a:r>
             <a:r>
-              <a:rPr lang="en-US" sz="3600" dirty="0">
+              <a:rPr lang="en-US" sz="3200" dirty="0">
                 <a:latin typeface="Arial" panose="020B0604020202020204" pitchFamily="34" charset="0"/>
               </a:rPr>
               <a:t>., HPPC, US06, UDDS</a:t>
@@ -5190,10 +5063,18 @@
           </a:p>
           <a:p>
             <a:r>
-              <a:rPr lang="en-US" sz="3600" dirty="0">
+              <a:rPr lang="en-US" sz="3200" dirty="0">
                 <a:latin typeface="Arial" panose="020B0604020202020204" pitchFamily="34" charset="0"/>
               </a:rPr>
-              <a:t>For validation, one of each drive cycle was held out at different temperatures</a:t>
+              <a:t>First validation held out one of each drive cycle</a:t>
+            </a:r>
+          </a:p>
+          <a:p>
+            <a:r>
+              <a:rPr lang="en-US" sz="3200" dirty="0">
+                <a:latin typeface="Arial" panose="020B0604020202020204" pitchFamily="34" charset="0"/>
+              </a:rPr>
+              <a:t>Second validation held out all of one drive cycle</a:t>
             </a:r>
           </a:p>
         </p:txBody>
@@ -5213,7 +5094,7 @@
         <p:spPr>
           <a:xfrm>
             <a:off x="914400" y="5288911"/>
-            <a:ext cx="9239250" cy="2862322"/>
+            <a:ext cx="9239250" cy="2554545"/>
           </a:xfrm>
           <a:prstGeom prst="rect">
             <a:avLst/>
@@ -5231,7 +5112,7 @@
               <a:buChar char="•"/>
             </a:pPr>
             <a:r>
-              <a:rPr lang="en-US" sz="3600" dirty="0">
+              <a:rPr lang="en-US" sz="3200" dirty="0">
                 <a:latin typeface="Arial" panose="020B0604020202020204" pitchFamily="34" charset="0"/>
               </a:rPr>
               <a:t>Our project aims to address whether ML can be used to model battery voltage</a:t>
@@ -5243,10 +5124,10 @@
               <a:buChar char="•"/>
             </a:pPr>
             <a:r>
-              <a:rPr lang="en-US" sz="3600" dirty="0">
+              <a:rPr lang="en-US" sz="3200" dirty="0">
                 <a:latin typeface="Arial" panose="020B0604020202020204" pitchFamily="34" charset="0"/>
               </a:rPr>
-              <a:t>We hope ML may be more accurate than circuit models and more computationally feasible than physics models</a:t>
+              <a:t>We hope ML may offer an alternative more accurate than circuit models and more computationally feasible than physics models</a:t>
             </a:r>
           </a:p>
         </p:txBody>
@@ -5265,8 +5146,8 @@
         </p:nvSpPr>
         <p:spPr>
           <a:xfrm>
-            <a:off x="778114" y="9606284"/>
-            <a:ext cx="9239250" cy="17266265"/>
+            <a:off x="778114" y="8878634"/>
+            <a:ext cx="9239250" cy="8463855"/>
           </a:xfrm>
           <a:prstGeom prst="rect">
             <a:avLst/>
@@ -5279,19 +5160,16 @@
           </a:bodyPr>
           <a:lstStyle/>
           <a:p>
-            <a:r>
-              <a:rPr lang="en-US" sz="3600" dirty="0">
-                <a:latin typeface="Arial" panose="020B0604020202020204" pitchFamily="34" charset="0"/>
-              </a:rPr>
-              <a:t>We compare performance of ML models with circuit models, so we ensure the ML models use the same inputs (I and SoC)</a:t>
-            </a:r>
+            <a:endParaRPr lang="en-US" sz="3200" dirty="0">
+              <a:latin typeface="Arial" panose="020B0604020202020204" pitchFamily="34" charset="0"/>
+            </a:endParaRPr>
           </a:p>
           <a:p>
             <a:pPr marL="571500" indent="-571500">
               <a:buFont typeface="Arial" panose="020B0604020202020204" pitchFamily="34" charset="0"/>
               <a:buChar char="•"/>
             </a:pPr>
-            <a:endParaRPr lang="en-US" sz="3600" dirty="0">
+            <a:endParaRPr lang="en-US" sz="3200" dirty="0">
               <a:latin typeface="Arial" panose="020B0604020202020204" pitchFamily="34" charset="0"/>
             </a:endParaRPr>
           </a:p>
@@ -5300,7 +5178,7 @@
               <a:buFont typeface="Arial" panose="020B0604020202020204" pitchFamily="34" charset="0"/>
               <a:buChar char="•"/>
             </a:pPr>
-            <a:endParaRPr lang="en-US" sz="3600" dirty="0">
+            <a:endParaRPr lang="en-US" sz="3200" dirty="0">
               <a:latin typeface="Arial" panose="020B0604020202020204" pitchFamily="34" charset="0"/>
             </a:endParaRPr>
           </a:p>
@@ -5309,7 +5187,7 @@
               <a:buFont typeface="Arial" panose="020B0604020202020204" pitchFamily="34" charset="0"/>
               <a:buChar char="•"/>
             </a:pPr>
-            <a:endParaRPr lang="en-US" sz="3600" dirty="0">
+            <a:endParaRPr lang="en-US" sz="3200" dirty="0">
               <a:latin typeface="Arial" panose="020B0604020202020204" pitchFamily="34" charset="0"/>
             </a:endParaRPr>
           </a:p>
@@ -5318,7 +5196,37 @@
               <a:buFont typeface="Arial" panose="020B0604020202020204" pitchFamily="34" charset="0"/>
               <a:buChar char="•"/>
             </a:pPr>
-            <a:endParaRPr lang="en-US" sz="3600" dirty="0">
+            <a:endParaRPr lang="en-US" sz="3200" dirty="0">
+              <a:latin typeface="Arial" panose="020B0604020202020204" pitchFamily="34" charset="0"/>
+            </a:endParaRPr>
+          </a:p>
+          <a:p>
+            <a:endParaRPr lang="en-US" sz="3200" dirty="0">
+              <a:latin typeface="Arial" panose="020B0604020202020204" pitchFamily="34" charset="0"/>
+            </a:endParaRPr>
+          </a:p>
+          <a:p>
+            <a:endParaRPr lang="en-US" sz="3200" dirty="0">
+              <a:latin typeface="Arial" panose="020B0604020202020204" pitchFamily="34" charset="0"/>
+            </a:endParaRPr>
+          </a:p>
+          <a:p>
+            <a:endParaRPr lang="en-US" sz="3200" dirty="0">
+              <a:latin typeface="Arial" panose="020B0604020202020204" pitchFamily="34" charset="0"/>
+            </a:endParaRPr>
+          </a:p>
+          <a:p>
+            <a:endParaRPr lang="en-US" sz="3200" dirty="0">
+              <a:latin typeface="Arial" panose="020B0604020202020204" pitchFamily="34" charset="0"/>
+            </a:endParaRPr>
+          </a:p>
+          <a:p>
+            <a:endParaRPr lang="en-US" sz="3200" dirty="0">
+              <a:latin typeface="Arial" panose="020B0604020202020204" pitchFamily="34" charset="0"/>
+            </a:endParaRPr>
+          </a:p>
+          <a:p>
+            <a:endParaRPr lang="en-US" sz="3200" dirty="0">
               <a:latin typeface="Arial" panose="020B0604020202020204" pitchFamily="34" charset="0"/>
             </a:endParaRPr>
           </a:p>
@@ -5327,7 +5235,7 @@
               <a:buFont typeface="Arial" panose="020B0604020202020204" pitchFamily="34" charset="0"/>
               <a:buChar char="•"/>
             </a:pPr>
-            <a:endParaRPr lang="en-US" sz="3600" dirty="0">
+            <a:endParaRPr lang="en-US" sz="3200" i="1" dirty="0">
               <a:latin typeface="Arial" panose="020B0604020202020204" pitchFamily="34" charset="0"/>
             </a:endParaRPr>
           </a:p>
@@ -5336,511 +5244,78 @@
               <a:buFont typeface="Arial" panose="020B0604020202020204" pitchFamily="34" charset="0"/>
               <a:buChar char="•"/>
             </a:pPr>
-            <a:endParaRPr lang="en-US" sz="3600" dirty="0">
-              <a:latin typeface="Arial" panose="020B0604020202020204" pitchFamily="34" charset="0"/>
-            </a:endParaRPr>
+            <a:r>
+              <a:rPr lang="en-US" sz="3200" i="1" dirty="0" err="1">
+                <a:latin typeface="Arial" panose="020B0604020202020204" pitchFamily="34" charset="0"/>
+              </a:rPr>
+              <a:t>nn_relu</a:t>
+            </a:r>
+            <a:r>
+              <a:rPr lang="en-US" sz="3200" i="1" dirty="0">
+                <a:latin typeface="Arial" panose="020B0604020202020204" pitchFamily="34" charset="0"/>
+              </a:rPr>
+              <a:t> </a:t>
+            </a:r>
+            <a:r>
+              <a:rPr lang="en-US" sz="3200" dirty="0">
+                <a:latin typeface="Arial" panose="020B0604020202020204" pitchFamily="34" charset="0"/>
+              </a:rPr>
+              <a:t>and </a:t>
+            </a:r>
+            <a:r>
+              <a:rPr lang="en-US" sz="3200" i="1" dirty="0" err="1">
+                <a:latin typeface="Arial" panose="020B0604020202020204" pitchFamily="34" charset="0"/>
+              </a:rPr>
+              <a:t>nn_tanh</a:t>
+            </a:r>
+            <a:r>
+              <a:rPr lang="en-US" sz="3200" i="1" dirty="0">
+                <a:latin typeface="Arial" panose="020B0604020202020204" pitchFamily="34" charset="0"/>
+              </a:rPr>
+              <a:t> </a:t>
+            </a:r>
+            <a:r>
+              <a:rPr lang="en-US" sz="3200" dirty="0">
+                <a:latin typeface="Arial" panose="020B0604020202020204" pitchFamily="34" charset="0"/>
+              </a:rPr>
+              <a:t>3 layer NNs with the architecture above and </a:t>
+            </a:r>
+            <a:r>
+              <a:rPr lang="en-US" sz="3200" dirty="0" err="1">
+                <a:latin typeface="Arial" panose="020B0604020202020204" pitchFamily="34" charset="0"/>
+              </a:rPr>
+              <a:t>relu</a:t>
+            </a:r>
+            <a:r>
+              <a:rPr lang="en-US" sz="3200" dirty="0">
+                <a:latin typeface="Arial" panose="020B0604020202020204" pitchFamily="34" charset="0"/>
+              </a:rPr>
+              <a:t> / tanh activations</a:t>
+            </a:r>
           </a:p>
           <a:p>
             <a:pPr marL="571500" indent="-571500">
               <a:buFont typeface="Arial" panose="020B0604020202020204" pitchFamily="34" charset="0"/>
               <a:buChar char="•"/>
             </a:pPr>
+            <a:r>
+              <a:rPr lang="en-US" sz="3200" i="1" dirty="0" err="1">
+                <a:latin typeface="Arial" panose="020B0604020202020204" pitchFamily="34" charset="0"/>
+              </a:rPr>
+              <a:t>lstm</a:t>
+            </a:r>
+            <a:r>
+              <a:rPr lang="en-US" sz="3200" dirty="0">
+                <a:latin typeface="Arial" panose="020B0604020202020204" pitchFamily="34" charset="0"/>
+              </a:rPr>
+              <a:t> a 2 layer NN with 20 recurrent neurons using tanh activations and sigmoid connections followed by 1 neuron FC linear layer</a:t>
+            </a:r>
             <a:endParaRPr lang="en-US" sz="3600" dirty="0">
               <a:latin typeface="Arial" panose="020B0604020202020204" pitchFamily="34" charset="0"/>
             </a:endParaRPr>
           </a:p>
-          <a:p>
-            <a:pPr marL="571500" indent="-571500">
-              <a:buFont typeface="Arial" panose="020B0604020202020204" pitchFamily="34" charset="0"/>
-              <a:buChar char="•"/>
-            </a:pPr>
-            <a:endParaRPr lang="en-US" sz="3600" dirty="0">
-              <a:latin typeface="Arial" panose="020B0604020202020204" pitchFamily="34" charset="0"/>
-            </a:endParaRPr>
-          </a:p>
-          <a:p>
-            <a:r>
-              <a:rPr lang="en-US" sz="3600" dirty="0">
-                <a:latin typeface="Arial" panose="020B0604020202020204" pitchFamily="34" charset="0"/>
-              </a:rPr>
-              <a:t>Three ML models were used</a:t>
-            </a:r>
-          </a:p>
-          <a:p>
-            <a:pPr marL="571500" indent="-571500">
-              <a:buFont typeface="Arial" panose="020B0604020202020204" pitchFamily="34" charset="0"/>
-              <a:buChar char="•"/>
-            </a:pPr>
-            <a:r>
-              <a:rPr lang="en-US" sz="3600" dirty="0" err="1">
-                <a:latin typeface="Arial" panose="020B0604020202020204" pitchFamily="34" charset="0"/>
-              </a:rPr>
-              <a:t>nn_relu</a:t>
-            </a:r>
-            <a:r>
-              <a:rPr lang="en-US" sz="3600" dirty="0">
-                <a:latin typeface="Arial" panose="020B0604020202020204" pitchFamily="34" charset="0"/>
-              </a:rPr>
-              <a:t> a 3 layer NN with [8, 4, 2] neurons per layer and </a:t>
-            </a:r>
-            <a:r>
-              <a:rPr lang="en-US" sz="3600" dirty="0" err="1">
-                <a:latin typeface="Arial" panose="020B0604020202020204" pitchFamily="34" charset="0"/>
-              </a:rPr>
-              <a:t>relu</a:t>
-            </a:r>
-            <a:r>
-              <a:rPr lang="en-US" sz="3600" dirty="0">
-                <a:latin typeface="Arial" panose="020B0604020202020204" pitchFamily="34" charset="0"/>
-              </a:rPr>
-              <a:t> activations</a:t>
-            </a:r>
-          </a:p>
-          <a:p>
-            <a:pPr marL="571500" indent="-571500">
-              <a:buFont typeface="Arial" panose="020B0604020202020204" pitchFamily="34" charset="0"/>
-              <a:buChar char="•"/>
-            </a:pPr>
-            <a:r>
-              <a:rPr lang="en-US" sz="3600" dirty="0" err="1">
-                <a:latin typeface="Arial" panose="020B0604020202020204" pitchFamily="34" charset="0"/>
-              </a:rPr>
-              <a:t>nn_tanh</a:t>
-            </a:r>
-            <a:r>
-              <a:rPr lang="en-US" sz="3600" dirty="0">
-                <a:latin typeface="Arial" panose="020B0604020202020204" pitchFamily="34" charset="0"/>
-              </a:rPr>
-              <a:t> a 3 layer NN with [8, 4, 2] neurons per layer and tanh activations</a:t>
-            </a:r>
-          </a:p>
-          <a:p>
-            <a:pPr marL="571500" indent="-571500">
-              <a:buFont typeface="Arial" panose="020B0604020202020204" pitchFamily="34" charset="0"/>
-              <a:buChar char="•"/>
-            </a:pPr>
-            <a:r>
-              <a:rPr lang="en-US" sz="3600" dirty="0" err="1">
-                <a:latin typeface="Arial" panose="020B0604020202020204" pitchFamily="34" charset="0"/>
-              </a:rPr>
-              <a:t>lstm</a:t>
-            </a:r>
-            <a:r>
-              <a:rPr lang="en-US" sz="3600" dirty="0">
-                <a:latin typeface="Arial" panose="020B0604020202020204" pitchFamily="34" charset="0"/>
-              </a:rPr>
-              <a:t> 2 layer N with 20 recurrent neurons with tanh activations and sigmoid connections followed by 1 neuron with linear activations</a:t>
-            </a:r>
-          </a:p>
-          <a:p>
-            <a:pPr marL="571500" indent="-571500">
-              <a:buFont typeface="Arial" panose="020B0604020202020204" pitchFamily="34" charset="0"/>
-              <a:buChar char="•"/>
-            </a:pPr>
-            <a:endParaRPr lang="en-US" sz="3600" dirty="0">
-              <a:latin typeface="Arial" panose="020B0604020202020204" pitchFamily="34" charset="0"/>
-            </a:endParaRPr>
-          </a:p>
-          <a:p>
-            <a:pPr marL="571500" indent="-571500">
-              <a:buFont typeface="Arial" panose="020B0604020202020204" pitchFamily="34" charset="0"/>
-              <a:buChar char="•"/>
-            </a:pPr>
-            <a:endParaRPr lang="en-US" sz="3600" dirty="0">
-              <a:latin typeface="Arial" panose="020B0604020202020204" pitchFamily="34" charset="0"/>
-            </a:endParaRPr>
-          </a:p>
-          <a:p>
-            <a:pPr marL="571500" indent="-571500">
-              <a:buFont typeface="Arial" panose="020B0604020202020204" pitchFamily="34" charset="0"/>
-              <a:buChar char="•"/>
-            </a:pPr>
-            <a:endParaRPr lang="en-US" sz="3600" dirty="0">
-              <a:latin typeface="Arial" panose="020B0604020202020204" pitchFamily="34" charset="0"/>
-            </a:endParaRPr>
-          </a:p>
-          <a:p>
-            <a:pPr marL="571500" indent="-571500">
-              <a:buFont typeface="Arial" panose="020B0604020202020204" pitchFamily="34" charset="0"/>
-              <a:buChar char="•"/>
-            </a:pPr>
-            <a:endParaRPr lang="en-US" sz="3600" dirty="0">
-              <a:latin typeface="Arial" panose="020B0604020202020204" pitchFamily="34" charset="0"/>
-            </a:endParaRPr>
-          </a:p>
-          <a:p>
-            <a:pPr marL="571500" indent="-571500">
-              <a:buFont typeface="Arial" panose="020B0604020202020204" pitchFamily="34" charset="0"/>
-              <a:buChar char="•"/>
-            </a:pPr>
-            <a:endParaRPr lang="en-US" sz="3600" dirty="0">
-              <a:latin typeface="Arial" panose="020B0604020202020204" pitchFamily="34" charset="0"/>
-            </a:endParaRPr>
-          </a:p>
-          <a:p>
-            <a:pPr marL="571500" indent="-571500">
-              <a:buFont typeface="Arial" panose="020B0604020202020204" pitchFamily="34" charset="0"/>
-              <a:buChar char="•"/>
-            </a:pPr>
-            <a:endParaRPr lang="en-US" sz="3600" dirty="0">
-              <a:latin typeface="Arial" panose="020B0604020202020204" pitchFamily="34" charset="0"/>
-            </a:endParaRPr>
-          </a:p>
-          <a:p>
-            <a:pPr marL="571500" indent="-571500">
-              <a:buFont typeface="Arial" panose="020B0604020202020204" pitchFamily="34" charset="0"/>
-              <a:buChar char="•"/>
-            </a:pPr>
-            <a:endParaRPr lang="en-US" sz="3600" dirty="0">
-              <a:latin typeface="Arial" panose="020B0604020202020204" pitchFamily="34" charset="0"/>
-            </a:endParaRPr>
-          </a:p>
-          <a:p>
-            <a:pPr marL="571500" indent="-571500">
-              <a:buFont typeface="Arial" panose="020B0604020202020204" pitchFamily="34" charset="0"/>
-              <a:buChar char="•"/>
-            </a:pPr>
-            <a:endParaRPr lang="en-US" sz="3600" dirty="0">
-              <a:latin typeface="Arial" panose="020B0604020202020204" pitchFamily="34" charset="0"/>
-            </a:endParaRPr>
-          </a:p>
-          <a:p>
-            <a:pPr marL="571500" indent="-571500">
-              <a:buFont typeface="Arial" panose="020B0604020202020204" pitchFamily="34" charset="0"/>
-              <a:buChar char="•"/>
-            </a:pPr>
-            <a:endParaRPr lang="en-US" sz="3600" dirty="0">
-              <a:latin typeface="Arial" panose="020B0604020202020204" pitchFamily="34" charset="0"/>
-            </a:endParaRPr>
-          </a:p>
-          <a:p>
-            <a:endParaRPr lang="en-US" sz="3600" dirty="0">
-              <a:latin typeface="Arial" panose="020B0604020202020204" pitchFamily="34" charset="0"/>
-            </a:endParaRPr>
-          </a:p>
-        </p:txBody>
-      </p:sp>
-      <p:grpSp>
-        <p:nvGrpSpPr>
-          <p:cNvPr id="17" name="Group 16">
-            <a:extLst>
-              <a:ext uri="{FF2B5EF4-FFF2-40B4-BE49-F238E27FC236}">
-                <a16:creationId xmlns:a16="http://schemas.microsoft.com/office/drawing/2014/main" id="{F4262788-FE86-5C4A-BA43-37CF616168A7}"/>
-              </a:ext>
-            </a:extLst>
-          </p:cNvPr>
-          <p:cNvGrpSpPr/>
-          <p:nvPr/>
-        </p:nvGrpSpPr>
-        <p:grpSpPr>
-          <a:xfrm>
-            <a:off x="2348853" y="13574314"/>
-            <a:ext cx="6097772" cy="1961987"/>
-            <a:chOff x="2590800" y="14956303"/>
-            <a:chExt cx="5834742" cy="2453816"/>
-          </a:xfrm>
-        </p:grpSpPr>
-        <p:sp>
-          <p:nvSpPr>
-            <p:cNvPr id="3" name="Rectangle 2">
-              <a:extLst>
-                <a:ext uri="{FF2B5EF4-FFF2-40B4-BE49-F238E27FC236}">
-                  <a16:creationId xmlns:a16="http://schemas.microsoft.com/office/drawing/2014/main" id="{3AD924BE-DB2D-3A42-9F10-F7808AC8D717}"/>
-                </a:ext>
-              </a:extLst>
-            </p:cNvPr>
-            <p:cNvSpPr/>
-            <p:nvPr/>
-          </p:nvSpPr>
-          <p:spPr>
-            <a:xfrm>
-              <a:off x="3831771" y="15286460"/>
-              <a:ext cx="3352800" cy="2123659"/>
-            </a:xfrm>
-            <a:prstGeom prst="rect">
-              <a:avLst/>
-            </a:prstGeom>
-            <a:solidFill>
-              <a:schemeClr val="bg1"/>
-            </a:solidFill>
-            <a:ln>
-              <a:solidFill>
-                <a:schemeClr val="tx1"/>
-              </a:solidFill>
-            </a:ln>
-          </p:spPr>
-          <p:style>
-            <a:lnRef idx="2">
-              <a:schemeClr val="accent1">
-                <a:shade val="50000"/>
-              </a:schemeClr>
-            </a:lnRef>
-            <a:fillRef idx="1">
-              <a:schemeClr val="accent1"/>
-            </a:fillRef>
-            <a:effectRef idx="0">
-              <a:schemeClr val="accent1"/>
-            </a:effectRef>
-            <a:fontRef idx="minor">
-              <a:schemeClr val="lt1"/>
-            </a:fontRef>
-          </p:style>
-          <p:txBody>
-            <a:bodyPr rtlCol="0" anchor="ctr"/>
-            <a:lstStyle/>
-            <a:p>
-              <a:pPr algn="ctr"/>
-              <a:r>
-                <a:rPr lang="en-US" sz="3600" dirty="0">
-                  <a:solidFill>
-                    <a:schemeClr val="tx1"/>
-                  </a:solidFill>
-                  <a:latin typeface="Arial" panose="020B0604020202020204" pitchFamily="34" charset="0"/>
-                  <a:cs typeface="Arial" panose="020B0604020202020204" pitchFamily="34" charset="0"/>
-                </a:rPr>
-                <a:t>ML Model</a:t>
-              </a:r>
-            </a:p>
-          </p:txBody>
-        </p:sp>
-        <p:cxnSp>
-          <p:nvCxnSpPr>
-            <p:cNvPr id="29" name="Straight Arrow Connector 28">
-              <a:extLst>
-                <a:ext uri="{FF2B5EF4-FFF2-40B4-BE49-F238E27FC236}">
-                  <a16:creationId xmlns:a16="http://schemas.microsoft.com/office/drawing/2014/main" id="{8C322015-61FB-8341-B84A-5D2B750BAD78}"/>
-                </a:ext>
-              </a:extLst>
-            </p:cNvPr>
-            <p:cNvCxnSpPr/>
-            <p:nvPr/>
-          </p:nvCxnSpPr>
-          <p:spPr>
-            <a:xfrm>
-              <a:off x="7184571" y="16306800"/>
-              <a:ext cx="1240971" cy="0"/>
-            </a:xfrm>
-            <a:prstGeom prst="straightConnector1">
-              <a:avLst/>
-            </a:prstGeom>
-            <a:ln w="76200">
-              <a:solidFill>
-                <a:schemeClr val="tx1"/>
-              </a:solidFill>
-              <a:tailEnd type="triangle"/>
-            </a:ln>
-          </p:spPr>
-          <p:style>
-            <a:lnRef idx="1">
-              <a:schemeClr val="accent1"/>
-            </a:lnRef>
-            <a:fillRef idx="0">
-              <a:schemeClr val="accent1"/>
-            </a:fillRef>
-            <a:effectRef idx="0">
-              <a:schemeClr val="accent1"/>
-            </a:effectRef>
-            <a:fontRef idx="minor">
-              <a:schemeClr val="tx1"/>
-            </a:fontRef>
-          </p:style>
-        </p:cxnSp>
-        <p:sp>
-          <p:nvSpPr>
-            <p:cNvPr id="10" name="TextBox 9">
-              <a:extLst>
-                <a:ext uri="{FF2B5EF4-FFF2-40B4-BE49-F238E27FC236}">
-                  <a16:creationId xmlns:a16="http://schemas.microsoft.com/office/drawing/2014/main" id="{69CC321C-FD5F-9945-A8DC-7D531525F126}"/>
-                </a:ext>
-              </a:extLst>
-            </p:cNvPr>
-            <p:cNvSpPr txBox="1"/>
-            <p:nvPr/>
-          </p:nvSpPr>
-          <p:spPr>
-            <a:xfrm>
-              <a:off x="7558835" y="15485677"/>
-              <a:ext cx="492443" cy="646331"/>
-            </a:xfrm>
-            <a:prstGeom prst="rect">
-              <a:avLst/>
-            </a:prstGeom>
-            <a:noFill/>
-          </p:spPr>
-          <p:txBody>
-            <a:bodyPr wrap="none" rtlCol="0">
-              <a:spAutoFit/>
-            </a:bodyPr>
-            <a:lstStyle/>
-            <a:p>
-              <a:r>
-                <a:rPr lang="en-US" sz="3600" dirty="0">
-                  <a:latin typeface="Arial" panose="020B0604020202020204" pitchFamily="34" charset="0"/>
-                </a:rPr>
-                <a:t>V</a:t>
-              </a:r>
-            </a:p>
-          </p:txBody>
-        </p:sp>
-        <p:cxnSp>
-          <p:nvCxnSpPr>
-            <p:cNvPr id="30" name="Straight Arrow Connector 29">
-              <a:extLst>
-                <a:ext uri="{FF2B5EF4-FFF2-40B4-BE49-F238E27FC236}">
-                  <a16:creationId xmlns:a16="http://schemas.microsoft.com/office/drawing/2014/main" id="{E395CF83-C343-4346-8BBB-F8E663C0211A}"/>
-                </a:ext>
-              </a:extLst>
-            </p:cNvPr>
-            <p:cNvCxnSpPr/>
-            <p:nvPr/>
-          </p:nvCxnSpPr>
-          <p:spPr>
-            <a:xfrm>
-              <a:off x="2590800" y="15826009"/>
-              <a:ext cx="1240971" cy="0"/>
-            </a:xfrm>
-            <a:prstGeom prst="straightConnector1">
-              <a:avLst/>
-            </a:prstGeom>
-            <a:ln w="76200">
-              <a:solidFill>
-                <a:schemeClr val="tx1"/>
-              </a:solidFill>
-              <a:tailEnd type="triangle"/>
-            </a:ln>
-          </p:spPr>
-          <p:style>
-            <a:lnRef idx="1">
-              <a:schemeClr val="accent1"/>
-            </a:lnRef>
-            <a:fillRef idx="0">
-              <a:schemeClr val="accent1"/>
-            </a:fillRef>
-            <a:effectRef idx="0">
-              <a:schemeClr val="accent1"/>
-            </a:effectRef>
-            <a:fontRef idx="minor">
-              <a:schemeClr val="tx1"/>
-            </a:fontRef>
-          </p:style>
-        </p:cxnSp>
-        <p:sp>
-          <p:nvSpPr>
-            <p:cNvPr id="36" name="TextBox 35">
-              <a:extLst>
-                <a:ext uri="{FF2B5EF4-FFF2-40B4-BE49-F238E27FC236}">
-                  <a16:creationId xmlns:a16="http://schemas.microsoft.com/office/drawing/2014/main" id="{251DEAA1-3012-F94E-864D-BFBC6A35049F}"/>
-                </a:ext>
-              </a:extLst>
-            </p:cNvPr>
-            <p:cNvSpPr txBox="1"/>
-            <p:nvPr/>
-          </p:nvSpPr>
-          <p:spPr>
-            <a:xfrm>
-              <a:off x="2952499" y="14956303"/>
-              <a:ext cx="312906" cy="646331"/>
-            </a:xfrm>
-            <a:prstGeom prst="rect">
-              <a:avLst/>
-            </a:prstGeom>
-            <a:noFill/>
-          </p:spPr>
-          <p:txBody>
-            <a:bodyPr wrap="none" rtlCol="0">
-              <a:spAutoFit/>
-            </a:bodyPr>
-            <a:lstStyle/>
-            <a:p>
-              <a:r>
-                <a:rPr lang="en-US" sz="3600" dirty="0">
-                  <a:latin typeface="Arial" panose="020B0604020202020204" pitchFamily="34" charset="0"/>
-                </a:rPr>
-                <a:t>I</a:t>
-              </a:r>
-            </a:p>
-          </p:txBody>
-        </p:sp>
-        <p:cxnSp>
-          <p:nvCxnSpPr>
-            <p:cNvPr id="37" name="Straight Arrow Connector 36">
-              <a:extLst>
-                <a:ext uri="{FF2B5EF4-FFF2-40B4-BE49-F238E27FC236}">
-                  <a16:creationId xmlns:a16="http://schemas.microsoft.com/office/drawing/2014/main" id="{A3D50A9F-6C10-6A41-8E3B-178C180C80B8}"/>
-                </a:ext>
-              </a:extLst>
-            </p:cNvPr>
-            <p:cNvCxnSpPr/>
-            <p:nvPr/>
-          </p:nvCxnSpPr>
-          <p:spPr>
-            <a:xfrm>
-              <a:off x="2590800" y="16896219"/>
-              <a:ext cx="1240971" cy="0"/>
-            </a:xfrm>
-            <a:prstGeom prst="straightConnector1">
-              <a:avLst/>
-            </a:prstGeom>
-            <a:ln w="76200">
-              <a:solidFill>
-                <a:schemeClr val="tx1"/>
-              </a:solidFill>
-              <a:tailEnd type="triangle"/>
-            </a:ln>
-          </p:spPr>
-          <p:style>
-            <a:lnRef idx="1">
-              <a:schemeClr val="accent1"/>
-            </a:lnRef>
-            <a:fillRef idx="0">
-              <a:schemeClr val="accent1"/>
-            </a:fillRef>
-            <a:effectRef idx="0">
-              <a:schemeClr val="accent1"/>
-            </a:effectRef>
-            <a:fontRef idx="minor">
-              <a:schemeClr val="tx1"/>
-            </a:fontRef>
-          </p:style>
-        </p:cxnSp>
-        <p:sp>
-          <p:nvSpPr>
-            <p:cNvPr id="38" name="TextBox 37">
-              <a:extLst>
-                <a:ext uri="{FF2B5EF4-FFF2-40B4-BE49-F238E27FC236}">
-                  <a16:creationId xmlns:a16="http://schemas.microsoft.com/office/drawing/2014/main" id="{08040043-FCBB-1841-B73A-543B506A7848}"/>
-                </a:ext>
-              </a:extLst>
-            </p:cNvPr>
-            <p:cNvSpPr txBox="1"/>
-            <p:nvPr/>
-          </p:nvSpPr>
-          <p:spPr>
-            <a:xfrm>
-              <a:off x="2672190" y="16074133"/>
-              <a:ext cx="1082348" cy="646331"/>
-            </a:xfrm>
-            <a:prstGeom prst="rect">
-              <a:avLst/>
-            </a:prstGeom>
-            <a:noFill/>
-          </p:spPr>
-          <p:txBody>
-            <a:bodyPr wrap="none" rtlCol="0">
-              <a:spAutoFit/>
-            </a:bodyPr>
-            <a:lstStyle/>
-            <a:p>
-              <a:r>
-                <a:rPr lang="en-US" sz="3600" dirty="0">
-                  <a:latin typeface="Arial" panose="020B0604020202020204" pitchFamily="34" charset="0"/>
-                </a:rPr>
-                <a:t>SoC</a:t>
-              </a:r>
-            </a:p>
-          </p:txBody>
-        </p:sp>
-      </p:grpSp>
+        </p:txBody>
+      </p:sp>
       <p:grpSp>
         <p:nvGrpSpPr>
           <p:cNvPr id="53" name="Group 52">
@@ -5855,10 +5330,10 @@
         </p:nvGrpSpPr>
         <p:grpSpPr>
           <a:xfrm>
-            <a:off x="2305310" y="11365551"/>
-            <a:ext cx="6097772" cy="1961987"/>
-            <a:chOff x="2309607" y="14553232"/>
-            <a:chExt cx="6097772" cy="1961987"/>
+            <a:off x="1636083" y="8990001"/>
+            <a:ext cx="7959869" cy="2669718"/>
+            <a:chOff x="2309607" y="14800596"/>
+            <a:chExt cx="6097772" cy="1714612"/>
           </a:xfrm>
         </p:grpSpPr>
         <p:grpSp>
@@ -5875,10 +5350,10 @@
           </p:nvGrpSpPr>
           <p:grpSpPr>
             <a:xfrm>
-              <a:off x="2309607" y="14553232"/>
-              <a:ext cx="6097772" cy="1961987"/>
-              <a:chOff x="2590800" y="14956303"/>
-              <a:chExt cx="5834742" cy="2453816"/>
+              <a:off x="2309607" y="14800596"/>
+              <a:ext cx="6097772" cy="1714612"/>
+              <a:chOff x="2590800" y="15265688"/>
+              <a:chExt cx="5834742" cy="2144431"/>
             </a:xfrm>
           </p:grpSpPr>
           <p:sp>
@@ -5997,8 +5472,8 @@
             </p:nvSpPr>
             <p:spPr>
               <a:xfrm>
-                <a:off x="7558835" y="15485677"/>
-                <a:ext cx="492443" cy="646331"/>
+                <a:off x="7554104" y="15783726"/>
+                <a:ext cx="336295" cy="469716"/>
               </a:xfrm>
               <a:prstGeom prst="rect">
                 <a:avLst/>
@@ -6011,8 +5486,9 @@
               </a:bodyPr>
               <a:lstStyle/>
               <a:p>
+                <a:pPr algn="ctr"/>
                 <a:r>
-                  <a:rPr lang="en-US" sz="3600" dirty="0">
+                  <a:rPr lang="en-US" sz="3200" dirty="0">
                     <a:latin typeface="Arial" panose="020B0604020202020204" pitchFamily="34" charset="0"/>
                   </a:rPr>
                   <a:t>V</a:t>
@@ -6076,8 +5552,8 @@
             </p:nvSpPr>
             <p:spPr>
               <a:xfrm>
-                <a:off x="2952499" y="14956303"/>
-                <a:ext cx="312906" cy="646331"/>
+                <a:off x="2982728" y="15265688"/>
+                <a:ext cx="375511" cy="469715"/>
               </a:xfrm>
               <a:prstGeom prst="rect">
                 <a:avLst/>
@@ -6085,13 +5561,14 @@
               <a:noFill/>
             </p:spPr>
             <p:txBody>
-              <a:bodyPr wrap="none" rtlCol="0">
+              <a:bodyPr wrap="square" rtlCol="0">
                 <a:spAutoFit/>
               </a:bodyPr>
               <a:lstStyle/>
               <a:p>
+                <a:pPr algn="ctr"/>
                 <a:r>
-                  <a:rPr lang="en-US" sz="3600" dirty="0">
+                  <a:rPr lang="en-US" sz="3200" dirty="0">
                     <a:latin typeface="Arial" panose="020B0604020202020204" pitchFamily="34" charset="0"/>
                   </a:rPr>
                   <a:t>I</a:t>
@@ -6155,8 +5632,8 @@
             </p:nvSpPr>
             <p:spPr>
               <a:xfrm>
-                <a:off x="2672190" y="16074133"/>
-                <a:ext cx="1082348" cy="646331"/>
+                <a:off x="2810219" y="16322346"/>
+                <a:ext cx="720530" cy="469716"/>
               </a:xfrm>
               <a:prstGeom prst="rect">
                 <a:avLst/>
@@ -6169,12 +5646,16 @@
               </a:bodyPr>
               <a:lstStyle/>
               <a:p>
+                <a:pPr algn="ctr"/>
                 <a:r>
-                  <a:rPr lang="en-US" sz="3600" dirty="0">
+                  <a:rPr lang="en-US" sz="3200" dirty="0">
                     <a:latin typeface="Arial" panose="020B0604020202020204" pitchFamily="34" charset="0"/>
                   </a:rPr>
                   <a:t>SoC</a:t>
                 </a:r>
+                <a:endParaRPr lang="en-US" sz="3600" dirty="0">
+                  <a:latin typeface="Arial" panose="020B0604020202020204" pitchFamily="34" charset="0"/>
+                </a:endParaRPr>
               </a:p>
             </p:txBody>
           </p:sp>
@@ -6194,7 +5675,7 @@
             <p:nvPr/>
           </p:nvPicPr>
           <p:blipFill>
-            <a:blip r:embed="rId7">
+            <a:blip r:embed="rId4">
               <a:extLst>
                 <a:ext uri="{28A0092B-C50C-407E-A947-70E740481C1C}">
                   <a14:useLocalDpi xmlns:a14="http://schemas.microsoft.com/office/drawing/2010/main" val="0"/>
@@ -6230,7 +5711,7 @@
         </p:nvSpPr>
         <p:spPr>
           <a:xfrm>
-            <a:off x="10972800" y="8713804"/>
+            <a:off x="10909865" y="4340281"/>
             <a:ext cx="10972800" cy="830997"/>
           </a:xfrm>
           <a:prstGeom prst="rect">
@@ -6273,7 +5754,7 @@
         </p:nvCxnSpPr>
         <p:spPr>
           <a:xfrm flipH="1">
-            <a:off x="11887198" y="9562697"/>
+            <a:off x="11824263" y="5189174"/>
             <a:ext cx="9144000" cy="0"/>
           </a:xfrm>
           <a:prstGeom prst="line">
@@ -6314,8 +5795,8 @@
         </p:nvSpPr>
         <p:spPr>
           <a:xfrm>
-            <a:off x="11839573" y="9680330"/>
-            <a:ext cx="9239250" cy="646331"/>
+            <a:off x="11776638" y="5306807"/>
+            <a:ext cx="9239250" cy="2554545"/>
           </a:xfrm>
           <a:prstGeom prst="rect">
             <a:avLst/>
@@ -6333,10 +5814,582 @@
               <a:buChar char="•"/>
             </a:pPr>
             <a:r>
-              <a:rPr lang="en-US" sz="3600" dirty="0">
+              <a:rPr lang="en-US" sz="3200" dirty="0">
                 <a:latin typeface="Arial" panose="020B0604020202020204" pitchFamily="34" charset="0"/>
               </a:rPr>
-              <a:t>Blah</a:t>
+              <a:t>ML generalizes for battery voltage prediction</a:t>
+            </a:r>
+          </a:p>
+          <a:p>
+            <a:pPr marL="571500" indent="-571500">
+              <a:buFont typeface="Arial" panose="020B0604020202020204" pitchFamily="34" charset="0"/>
+              <a:buChar char="•"/>
+            </a:pPr>
+            <a:r>
+              <a:rPr lang="en-US" sz="3200" dirty="0">
+                <a:latin typeface="Arial" panose="020B0604020202020204" pitchFamily="34" charset="0"/>
+              </a:rPr>
+              <a:t>Predictions generalize to new drive cycles</a:t>
+            </a:r>
+          </a:p>
+          <a:p>
+            <a:pPr marL="571500" indent="-571500">
+              <a:buFont typeface="Arial" panose="020B0604020202020204" pitchFamily="34" charset="0"/>
+              <a:buChar char="•"/>
+            </a:pPr>
+            <a:r>
+              <a:rPr lang="en-US" sz="3200" dirty="0">
+                <a:latin typeface="Arial" panose="020B0604020202020204" pitchFamily="34" charset="0"/>
+              </a:rPr>
+              <a:t>Error and temperature appear related</a:t>
+            </a:r>
+          </a:p>
+          <a:p>
+            <a:pPr marL="571500" indent="-571500">
+              <a:buFont typeface="Arial" panose="020B0604020202020204" pitchFamily="34" charset="0"/>
+              <a:buChar char="•"/>
+            </a:pPr>
+            <a:r>
+              <a:rPr lang="en-US" sz="3200" dirty="0">
+                <a:latin typeface="Arial" panose="020B0604020202020204" pitchFamily="34" charset="0"/>
+              </a:rPr>
+              <a:t>ML models including temperature offer more robust prediction</a:t>
+            </a:r>
+          </a:p>
+        </p:txBody>
+      </p:sp>
+      <p:grpSp>
+        <p:nvGrpSpPr>
+          <p:cNvPr id="9" name="Group 8">
+            <a:extLst>
+              <a:ext uri="{FF2B5EF4-FFF2-40B4-BE49-F238E27FC236}">
+                <a16:creationId xmlns:a16="http://schemas.microsoft.com/office/drawing/2014/main" id="{8130BD1E-213A-A24B-8CC5-B6588A0DE3D1}"/>
+              </a:ext>
+            </a:extLst>
+          </p:cNvPr>
+          <p:cNvGrpSpPr/>
+          <p:nvPr/>
+        </p:nvGrpSpPr>
+        <p:grpSpPr>
+          <a:xfrm>
+            <a:off x="1636082" y="11744649"/>
+            <a:ext cx="7959869" cy="2750871"/>
+            <a:chOff x="2613540" y="15672551"/>
+            <a:chExt cx="6470067" cy="1592539"/>
+          </a:xfrm>
+        </p:grpSpPr>
+        <p:grpSp>
+          <p:nvGrpSpPr>
+            <p:cNvPr id="17" name="Group 16">
+              <a:extLst>
+                <a:ext uri="{FF2B5EF4-FFF2-40B4-BE49-F238E27FC236}">
+                  <a16:creationId xmlns:a16="http://schemas.microsoft.com/office/drawing/2014/main" id="{F4262788-FE86-5C4A-BA43-37CF616168A7}"/>
+                </a:ext>
+              </a:extLst>
+            </p:cNvPr>
+            <p:cNvGrpSpPr/>
+            <p:nvPr/>
+          </p:nvGrpSpPr>
+          <p:grpSpPr>
+            <a:xfrm>
+              <a:off x="2613540" y="15672551"/>
+              <a:ext cx="6470067" cy="1592539"/>
+              <a:chOff x="2590800" y="15200503"/>
+              <a:chExt cx="5834742" cy="2209616"/>
+            </a:xfrm>
+          </p:grpSpPr>
+          <p:sp>
+            <p:nvSpPr>
+              <p:cNvPr id="3" name="Rectangle 2">
+                <a:extLst>
+                  <a:ext uri="{FF2B5EF4-FFF2-40B4-BE49-F238E27FC236}">
+                    <a16:creationId xmlns:a16="http://schemas.microsoft.com/office/drawing/2014/main" id="{3AD924BE-DB2D-3A42-9F10-F7808AC8D717}"/>
+                  </a:ext>
+                </a:extLst>
+              </p:cNvPr>
+              <p:cNvSpPr/>
+              <p:nvPr/>
+            </p:nvSpPr>
+            <p:spPr>
+              <a:xfrm>
+                <a:off x="3831771" y="15286460"/>
+                <a:ext cx="3352800" cy="2123659"/>
+              </a:xfrm>
+              <a:prstGeom prst="rect">
+                <a:avLst/>
+              </a:prstGeom>
+              <a:solidFill>
+                <a:schemeClr val="bg1"/>
+              </a:solidFill>
+              <a:ln>
+                <a:solidFill>
+                  <a:schemeClr val="tx1"/>
+                </a:solidFill>
+              </a:ln>
+            </p:spPr>
+            <p:style>
+              <a:lnRef idx="2">
+                <a:schemeClr val="accent1">
+                  <a:shade val="50000"/>
+                </a:schemeClr>
+              </a:lnRef>
+              <a:fillRef idx="1">
+                <a:schemeClr val="accent1"/>
+              </a:fillRef>
+              <a:effectRef idx="0">
+                <a:schemeClr val="accent1"/>
+              </a:effectRef>
+              <a:fontRef idx="minor">
+                <a:schemeClr val="lt1"/>
+              </a:fontRef>
+            </p:style>
+            <p:txBody>
+              <a:bodyPr rtlCol="0" anchor="ctr"/>
+              <a:lstStyle/>
+              <a:p>
+                <a:pPr algn="ctr"/>
+                <a:endParaRPr lang="en-US" sz="3600" dirty="0">
+                  <a:solidFill>
+                    <a:schemeClr val="tx1"/>
+                  </a:solidFill>
+                  <a:latin typeface="Arial" panose="020B0604020202020204" pitchFamily="34" charset="0"/>
+                  <a:cs typeface="Arial" panose="020B0604020202020204" pitchFamily="34" charset="0"/>
+                </a:endParaRPr>
+              </a:p>
+            </p:txBody>
+          </p:sp>
+          <p:cxnSp>
+            <p:nvCxnSpPr>
+              <p:cNvPr id="29" name="Straight Arrow Connector 28">
+                <a:extLst>
+                  <a:ext uri="{FF2B5EF4-FFF2-40B4-BE49-F238E27FC236}">
+                    <a16:creationId xmlns:a16="http://schemas.microsoft.com/office/drawing/2014/main" id="{8C322015-61FB-8341-B84A-5D2B750BAD78}"/>
+                  </a:ext>
+                </a:extLst>
+              </p:cNvPr>
+              <p:cNvCxnSpPr/>
+              <p:nvPr/>
+            </p:nvCxnSpPr>
+            <p:spPr>
+              <a:xfrm>
+                <a:off x="7184571" y="16306800"/>
+                <a:ext cx="1240971" cy="0"/>
+              </a:xfrm>
+              <a:prstGeom prst="straightConnector1">
+                <a:avLst/>
+              </a:prstGeom>
+              <a:ln w="76200">
+                <a:solidFill>
+                  <a:schemeClr val="tx1"/>
+                </a:solidFill>
+                <a:tailEnd type="triangle"/>
+              </a:ln>
+            </p:spPr>
+            <p:style>
+              <a:lnRef idx="1">
+                <a:schemeClr val="accent1"/>
+              </a:lnRef>
+              <a:fillRef idx="0">
+                <a:schemeClr val="accent1"/>
+              </a:fillRef>
+              <a:effectRef idx="0">
+                <a:schemeClr val="accent1"/>
+              </a:effectRef>
+              <a:fontRef idx="minor">
+                <a:schemeClr val="tx1"/>
+              </a:fontRef>
+            </p:style>
+          </p:cxnSp>
+          <p:sp>
+            <p:nvSpPr>
+              <p:cNvPr id="10" name="TextBox 9">
+                <a:extLst>
+                  <a:ext uri="{FF2B5EF4-FFF2-40B4-BE49-F238E27FC236}">
+                    <a16:creationId xmlns:a16="http://schemas.microsoft.com/office/drawing/2014/main" id="{69CC321C-FD5F-9945-A8DC-7D531525F126}"/>
+                  </a:ext>
+                </a:extLst>
+              </p:cNvPr>
+              <p:cNvSpPr txBox="1"/>
+              <p:nvPr/>
+            </p:nvSpPr>
+            <p:spPr>
+              <a:xfrm>
+                <a:off x="7568903" y="15709939"/>
+                <a:ext cx="336295" cy="469716"/>
+              </a:xfrm>
+              <a:prstGeom prst="rect">
+                <a:avLst/>
+              </a:prstGeom>
+              <a:noFill/>
+            </p:spPr>
+            <p:txBody>
+              <a:bodyPr wrap="none" rtlCol="0">
+                <a:spAutoFit/>
+              </a:bodyPr>
+              <a:lstStyle/>
+              <a:p>
+                <a:pPr algn="ctr"/>
+                <a:r>
+                  <a:rPr lang="en-US" sz="3200" dirty="0">
+                    <a:latin typeface="Arial" panose="020B0604020202020204" pitchFamily="34" charset="0"/>
+                  </a:rPr>
+                  <a:t>V</a:t>
+                </a:r>
+              </a:p>
+            </p:txBody>
+          </p:sp>
+          <p:cxnSp>
+            <p:nvCxnSpPr>
+              <p:cNvPr id="30" name="Straight Arrow Connector 29">
+                <a:extLst>
+                  <a:ext uri="{FF2B5EF4-FFF2-40B4-BE49-F238E27FC236}">
+                    <a16:creationId xmlns:a16="http://schemas.microsoft.com/office/drawing/2014/main" id="{E395CF83-C343-4346-8BBB-F8E663C0211A}"/>
+                  </a:ext>
+                </a:extLst>
+              </p:cNvPr>
+              <p:cNvCxnSpPr/>
+              <p:nvPr/>
+            </p:nvCxnSpPr>
+            <p:spPr>
+              <a:xfrm>
+                <a:off x="2590800" y="15826009"/>
+                <a:ext cx="1240971" cy="0"/>
+              </a:xfrm>
+              <a:prstGeom prst="straightConnector1">
+                <a:avLst/>
+              </a:prstGeom>
+              <a:ln w="76200">
+                <a:solidFill>
+                  <a:schemeClr val="tx1"/>
+                </a:solidFill>
+                <a:tailEnd type="triangle"/>
+              </a:ln>
+            </p:spPr>
+            <p:style>
+              <a:lnRef idx="1">
+                <a:schemeClr val="accent1"/>
+              </a:lnRef>
+              <a:fillRef idx="0">
+                <a:schemeClr val="accent1"/>
+              </a:fillRef>
+              <a:effectRef idx="0">
+                <a:schemeClr val="accent1"/>
+              </a:effectRef>
+              <a:fontRef idx="minor">
+                <a:schemeClr val="tx1"/>
+              </a:fontRef>
+            </p:style>
+          </p:cxnSp>
+          <p:sp>
+            <p:nvSpPr>
+              <p:cNvPr id="36" name="TextBox 35">
+                <a:extLst>
+                  <a:ext uri="{FF2B5EF4-FFF2-40B4-BE49-F238E27FC236}">
+                    <a16:creationId xmlns:a16="http://schemas.microsoft.com/office/drawing/2014/main" id="{251DEAA1-3012-F94E-864D-BFBC6A35049F}"/>
+                  </a:ext>
+                </a:extLst>
+              </p:cNvPr>
+              <p:cNvSpPr txBox="1"/>
+              <p:nvPr/>
+            </p:nvSpPr>
+            <p:spPr>
+              <a:xfrm>
+                <a:off x="3054291" y="15200503"/>
+                <a:ext cx="218791" cy="469716"/>
+              </a:xfrm>
+              <a:prstGeom prst="rect">
+                <a:avLst/>
+              </a:prstGeom>
+              <a:noFill/>
+            </p:spPr>
+            <p:txBody>
+              <a:bodyPr wrap="none" rtlCol="0">
+                <a:spAutoFit/>
+              </a:bodyPr>
+              <a:lstStyle/>
+              <a:p>
+                <a:pPr algn="ctr"/>
+                <a:r>
+                  <a:rPr lang="en-US" sz="3200" dirty="0">
+                    <a:latin typeface="Arial" panose="020B0604020202020204" pitchFamily="34" charset="0"/>
+                  </a:rPr>
+                  <a:t>I</a:t>
+                </a:r>
+              </a:p>
+            </p:txBody>
+          </p:sp>
+          <p:cxnSp>
+            <p:nvCxnSpPr>
+              <p:cNvPr id="37" name="Straight Arrow Connector 36">
+                <a:extLst>
+                  <a:ext uri="{FF2B5EF4-FFF2-40B4-BE49-F238E27FC236}">
+                    <a16:creationId xmlns:a16="http://schemas.microsoft.com/office/drawing/2014/main" id="{A3D50A9F-6C10-6A41-8E3B-178C180C80B8}"/>
+                  </a:ext>
+                </a:extLst>
+              </p:cNvPr>
+              <p:cNvCxnSpPr/>
+              <p:nvPr/>
+            </p:nvCxnSpPr>
+            <p:spPr>
+              <a:xfrm>
+                <a:off x="2590800" y="16391125"/>
+                <a:ext cx="1240971" cy="0"/>
+              </a:xfrm>
+              <a:prstGeom prst="straightConnector1">
+                <a:avLst/>
+              </a:prstGeom>
+              <a:ln w="76200">
+                <a:solidFill>
+                  <a:schemeClr val="tx1"/>
+                </a:solidFill>
+                <a:tailEnd type="triangle"/>
+              </a:ln>
+            </p:spPr>
+            <p:style>
+              <a:lnRef idx="1">
+                <a:schemeClr val="accent1"/>
+              </a:lnRef>
+              <a:fillRef idx="0">
+                <a:schemeClr val="accent1"/>
+              </a:fillRef>
+              <a:effectRef idx="0">
+                <a:schemeClr val="accent1"/>
+              </a:effectRef>
+              <a:fontRef idx="minor">
+                <a:schemeClr val="tx1"/>
+              </a:fontRef>
+            </p:style>
+          </p:cxnSp>
+          <p:sp>
+            <p:nvSpPr>
+              <p:cNvPr id="38" name="TextBox 37">
+                <a:extLst>
+                  <a:ext uri="{FF2B5EF4-FFF2-40B4-BE49-F238E27FC236}">
+                    <a16:creationId xmlns:a16="http://schemas.microsoft.com/office/drawing/2014/main" id="{08040043-FCBB-1841-B73A-543B506A7848}"/>
+                  </a:ext>
+                </a:extLst>
+              </p:cNvPr>
+              <p:cNvSpPr txBox="1"/>
+              <p:nvPr/>
+            </p:nvSpPr>
+            <p:spPr>
+              <a:xfrm>
+                <a:off x="2810220" y="15915463"/>
+                <a:ext cx="797071" cy="469716"/>
+              </a:xfrm>
+              <a:prstGeom prst="rect">
+                <a:avLst/>
+              </a:prstGeom>
+              <a:noFill/>
+            </p:spPr>
+            <p:txBody>
+              <a:bodyPr wrap="square" rtlCol="0">
+                <a:spAutoFit/>
+              </a:bodyPr>
+              <a:lstStyle/>
+              <a:p>
+                <a:pPr algn="ctr"/>
+                <a:r>
+                  <a:rPr lang="en-US" sz="3200" dirty="0">
+                    <a:latin typeface="Arial" panose="020B0604020202020204" pitchFamily="34" charset="0"/>
+                  </a:rPr>
+                  <a:t>SoC</a:t>
+                </a:r>
+              </a:p>
+            </p:txBody>
+          </p:sp>
+        </p:grpSp>
+        <p:pic>
+          <p:nvPicPr>
+            <p:cNvPr id="8" name="Picture 7">
+              <a:extLst>
+                <a:ext uri="{FF2B5EF4-FFF2-40B4-BE49-F238E27FC236}">
+                  <a16:creationId xmlns:a16="http://schemas.microsoft.com/office/drawing/2014/main" id="{BC3C65B0-687A-2444-9DF5-7728913C5967}"/>
+                </a:ext>
+              </a:extLst>
+            </p:cNvPr>
+            <p:cNvPicPr>
+              <a:picLocks noChangeAspect="1"/>
+            </p:cNvPicPr>
+            <p:nvPr/>
+          </p:nvPicPr>
+          <p:blipFill>
+            <a:blip r:embed="rId5">
+              <a:extLst>
+                <a:ext uri="{28A0092B-C50C-407E-A947-70E740481C1C}">
+                  <a14:useLocalDpi xmlns:a14="http://schemas.microsoft.com/office/drawing/2010/main" val="0"/>
+                </a:ext>
+              </a:extLst>
+            </a:blip>
+            <a:stretch>
+              <a:fillRect/>
+            </a:stretch>
+          </p:blipFill>
+          <p:spPr>
+            <a:xfrm>
+              <a:off x="4256550" y="15773287"/>
+              <a:ext cx="3167350" cy="1485062"/>
+            </a:xfrm>
+            <a:prstGeom prst="rect">
+              <a:avLst/>
+            </a:prstGeom>
+          </p:spPr>
+        </p:pic>
+      </p:grpSp>
+      <p:cxnSp>
+        <p:nvCxnSpPr>
+          <p:cNvPr id="51" name="Straight Arrow Connector 50">
+            <a:extLst>
+              <a:ext uri="{FF2B5EF4-FFF2-40B4-BE49-F238E27FC236}">
+                <a16:creationId xmlns:a16="http://schemas.microsoft.com/office/drawing/2014/main" id="{EE49C961-4E66-4746-A294-3A609918D26F}"/>
+              </a:ext>
+            </a:extLst>
+          </p:cNvPr>
+          <p:cNvCxnSpPr/>
+          <p:nvPr/>
+        </p:nvCxnSpPr>
+        <p:spPr>
+          <a:xfrm>
+            <a:off x="1601903" y="14028055"/>
+            <a:ext cx="1692957" cy="0"/>
+          </a:xfrm>
+          <a:prstGeom prst="straightConnector1">
+            <a:avLst/>
+          </a:prstGeom>
+          <a:ln w="76200">
+            <a:solidFill>
+              <a:schemeClr val="tx1"/>
+            </a:solidFill>
+            <a:prstDash val="sysDot"/>
+            <a:tailEnd type="triangle"/>
+          </a:ln>
+        </p:spPr>
+        <p:style>
+          <a:lnRef idx="1">
+            <a:schemeClr val="accent1"/>
+          </a:lnRef>
+          <a:fillRef idx="0">
+            <a:schemeClr val="accent1"/>
+          </a:fillRef>
+          <a:effectRef idx="0">
+            <a:schemeClr val="accent1"/>
+          </a:effectRef>
+          <a:fontRef idx="minor">
+            <a:schemeClr val="tx1"/>
+          </a:fontRef>
+        </p:style>
+      </p:cxnSp>
+      <p:sp>
+        <p:nvSpPr>
+          <p:cNvPr id="54" name="TextBox 53">
+            <a:extLst>
+              <a:ext uri="{FF2B5EF4-FFF2-40B4-BE49-F238E27FC236}">
+                <a16:creationId xmlns:a16="http://schemas.microsoft.com/office/drawing/2014/main" id="{0441662A-9BCC-004D-B3C6-B2E1F0F3D000}"/>
+              </a:ext>
+            </a:extLst>
+          </p:cNvPr>
+          <p:cNvSpPr txBox="1"/>
+          <p:nvPr/>
+        </p:nvSpPr>
+        <p:spPr>
+          <a:xfrm>
+            <a:off x="1901240" y="13435878"/>
+            <a:ext cx="1087380" cy="584775"/>
+          </a:xfrm>
+          <a:prstGeom prst="rect">
+            <a:avLst/>
+          </a:prstGeom>
+          <a:noFill/>
+        </p:spPr>
+        <p:txBody>
+          <a:bodyPr wrap="square" rtlCol="0">
+            <a:spAutoFit/>
+          </a:bodyPr>
+          <a:lstStyle/>
+          <a:p>
+            <a:pPr algn="ctr"/>
+            <a:r>
+              <a:rPr lang="en-US" sz="3200" dirty="0">
+                <a:latin typeface="Arial" panose="020B0604020202020204" pitchFamily="34" charset="0"/>
+              </a:rPr>
+              <a:t>T</a:t>
+            </a:r>
+          </a:p>
+        </p:txBody>
+      </p:sp>
+      <p:sp>
+        <p:nvSpPr>
+          <p:cNvPr id="55" name="TextBox 54">
+            <a:extLst>
+              <a:ext uri="{FF2B5EF4-FFF2-40B4-BE49-F238E27FC236}">
+                <a16:creationId xmlns:a16="http://schemas.microsoft.com/office/drawing/2014/main" id="{D1DB182B-785D-F94C-8EE1-D3D2E1DDFD88}"/>
+              </a:ext>
+            </a:extLst>
+          </p:cNvPr>
+          <p:cNvSpPr txBox="1"/>
+          <p:nvPr/>
+        </p:nvSpPr>
+        <p:spPr>
+          <a:xfrm>
+            <a:off x="22933479" y="4340281"/>
+            <a:ext cx="9239250" cy="2554545"/>
+          </a:xfrm>
+          <a:prstGeom prst="rect">
+            <a:avLst/>
+          </a:prstGeom>
+          <a:noFill/>
+        </p:spPr>
+        <p:txBody>
+          <a:bodyPr wrap="square" rtlCol="0">
+            <a:spAutoFit/>
+          </a:bodyPr>
+          <a:lstStyle/>
+          <a:p>
+            <a:pPr marL="571500" indent="-571500">
+              <a:buFont typeface="Arial" panose="020B0604020202020204" pitchFamily="34" charset="0"/>
+              <a:buChar char="•"/>
+            </a:pPr>
+            <a:r>
+              <a:rPr lang="en-US" sz="3200" dirty="0">
+                <a:latin typeface="Arial" panose="020B0604020202020204" pitchFamily="34" charset="0"/>
+              </a:rPr>
+              <a:t>ML generalizes for battery voltage prediction</a:t>
+            </a:r>
+          </a:p>
+          <a:p>
+            <a:pPr marL="571500" indent="-571500">
+              <a:buFont typeface="Arial" panose="020B0604020202020204" pitchFamily="34" charset="0"/>
+              <a:buChar char="•"/>
+            </a:pPr>
+            <a:r>
+              <a:rPr lang="en-US" sz="3200" dirty="0">
+                <a:latin typeface="Arial" panose="020B0604020202020204" pitchFamily="34" charset="0"/>
+              </a:rPr>
+              <a:t>Predictions generalize to new drive cycles</a:t>
+            </a:r>
+          </a:p>
+          <a:p>
+            <a:pPr marL="571500" indent="-571500">
+              <a:buFont typeface="Arial" panose="020B0604020202020204" pitchFamily="34" charset="0"/>
+              <a:buChar char="•"/>
+            </a:pPr>
+            <a:r>
+              <a:rPr lang="en-US" sz="3200" dirty="0">
+                <a:latin typeface="Arial" panose="020B0604020202020204" pitchFamily="34" charset="0"/>
+              </a:rPr>
+              <a:t>Error and temperature appear related</a:t>
+            </a:r>
+          </a:p>
+          <a:p>
+            <a:pPr marL="571500" indent="-571500">
+              <a:buFont typeface="Arial" panose="020B0604020202020204" pitchFamily="34" charset="0"/>
+              <a:buChar char="•"/>
+            </a:pPr>
+            <a:r>
+              <a:rPr lang="en-US" sz="3200" dirty="0">
+                <a:latin typeface="Arial" panose="020B0604020202020204" pitchFamily="34" charset="0"/>
+              </a:rPr>
+              <a:t>ML models including temperature offer more robust prediction</a:t>
             </a:r>
           </a:p>
         </p:txBody>

</xml_diff>